<commit_message>
Presentation baseline updates (09.01.22).
</commit_message>
<xml_diff>
--- a/presentations/01_practicum_intro.pptx
+++ b/presentations/01_practicum_intro.pptx
@@ -5,7 +5,7 @@
     <p:sldMasterId id="2147483648" r:id="rId1"/>
   </p:sldMasterIdLst>
   <p:notesMasterIdLst>
-    <p:notesMasterId r:id="rId28"/>
+    <p:notesMasterId r:id="rId30"/>
   </p:notesMasterIdLst>
   <p:sldIdLst>
     <p:sldId id="324" r:id="rId2"/>
@@ -23,17 +23,19 @@
     <p:sldId id="331" r:id="rId14"/>
     <p:sldId id="335" r:id="rId15"/>
     <p:sldId id="326" r:id="rId16"/>
-    <p:sldId id="321" r:id="rId17"/>
-    <p:sldId id="292" r:id="rId18"/>
-    <p:sldId id="305" r:id="rId19"/>
-    <p:sldId id="306" r:id="rId20"/>
-    <p:sldId id="307" r:id="rId21"/>
-    <p:sldId id="308" r:id="rId22"/>
-    <p:sldId id="309" r:id="rId23"/>
-    <p:sldId id="310" r:id="rId24"/>
-    <p:sldId id="294" r:id="rId25"/>
-    <p:sldId id="333" r:id="rId26"/>
-    <p:sldId id="301" r:id="rId27"/>
+    <p:sldId id="336" r:id="rId17"/>
+    <p:sldId id="321" r:id="rId18"/>
+    <p:sldId id="292" r:id="rId19"/>
+    <p:sldId id="337" r:id="rId20"/>
+    <p:sldId id="305" r:id="rId21"/>
+    <p:sldId id="306" r:id="rId22"/>
+    <p:sldId id="307" r:id="rId23"/>
+    <p:sldId id="308" r:id="rId24"/>
+    <p:sldId id="309" r:id="rId25"/>
+    <p:sldId id="310" r:id="rId26"/>
+    <p:sldId id="333" r:id="rId27"/>
+    <p:sldId id="294" r:id="rId28"/>
+    <p:sldId id="301" r:id="rId29"/>
   </p:sldIdLst>
   <p:sldSz cx="12192000" cy="6858000"/>
   <p:notesSz cx="7023100" cy="9309100"/>
@@ -233,7 +235,7 @@
           <a:p>
             <a:fld id="{FD93C9B2-20F6-4DB1-B471-224337D0AC79}" type="datetimeFigureOut">
               <a:rPr lang="en-US" smtClean="0"/>
-              <a:t>8/29/2022</a:t>
+              <a:t>8/31/2022</a:t>
             </a:fld>
             <a:endParaRPr lang="en-US"/>
           </a:p>
@@ -1409,46 +1411,10 @@
           <a:bodyPr/>
           <a:lstStyle/>
           <a:p>
-            <a:pPr marL="233309" indent="-233309">
-              <a:buAutoNum type="arabicPeriod"/>
-            </a:pPr>
             <a:r>
               <a:rPr lang="en-US" dirty="0"/>
-              <a:t>Clive Humby, 2006.</a:t>
-            </a:r>
-          </a:p>
-          <a:p>
-            <a:pPr marL="233309" indent="-233309">
-              <a:buAutoNum type="arabicPeriod"/>
-            </a:pPr>
-            <a:r>
-              <a:rPr lang="en-US" dirty="0"/>
-              <a:t>Data powers deep learning AI systems</a:t>
-            </a:r>
-          </a:p>
-          <a:p>
-            <a:pPr defTabSz="933237">
-              <a:defRPr/>
-            </a:pPr>
-            <a:endParaRPr lang="en-US" dirty="0"/>
-          </a:p>
-          <a:p>
-            <a:pPr defTabSz="933237">
-              <a:defRPr/>
-            </a:pPr>
-            <a:r>
-              <a:rPr lang="en-US" dirty="0"/>
-              <a:t>=====</a:t>
-            </a:r>
-          </a:p>
-          <a:p>
-            <a:r>
-              <a:rPr lang="en-US" dirty="0"/>
-              <a:t>In 2006, a British entrepreneur named Clive Humby coined the phrase “Data is the new oil.”  Data powers A.I. systems, and it comes in a variety of formats.  Thus, data is a logical starting point for thinking about AI.  So, what kinds of data are you presently working with?  </a:t>
-            </a:r>
-          </a:p>
-          <a:p>
-            <a:endParaRPr lang="en-US" dirty="0"/>
+              <a:t>Now that we’ve introduced our Practicum AI program, let’s get practical.  How does one get an AI project off the ground?  Typically, a project begins with a research question or idea for a product.  But sometimes a unique dataset sets a project in motion.  When that’s the case, the data informs and delimits the “askable” questions.  The data and questions, in turn, drive the selection of suitable AI methods and techniques.  Question, data, and method all mutually influence each other – as pictured here with the bi-directional arrows.  In other words, you cannot think of one in isolation from the other two.</a:t>
+            </a:r>
           </a:p>
         </p:txBody>
       </p:sp>
@@ -1478,7 +1444,7 @@
     </p:spTree>
     <p:extLst>
       <p:ext uri="{BB962C8B-B14F-4D97-AF65-F5344CB8AC3E}">
-        <p14:creationId xmlns:p14="http://schemas.microsoft.com/office/powerpoint/2010/main" val="2921774388"/>
+        <p14:creationId xmlns:p14="http://schemas.microsoft.com/office/powerpoint/2010/main" val="3515819231"/>
       </p:ext>
     </p:extLst>
   </p:cSld>
@@ -1537,15 +1503,7 @@
             </a:pPr>
             <a:r>
               <a:rPr lang="en-US" dirty="0"/>
-              <a:t>Bill Inman – </a:t>
-            </a:r>
-            <a:r>
-              <a:rPr lang="en-US" i="1" dirty="0"/>
-              <a:t>Data Architecture: A Primer for the Data Scientist – </a:t>
-            </a:r>
-            <a:r>
-              <a:rPr lang="en-US" i="0" dirty="0"/>
-              <a:t>structured / unstructured data – most data is unstructured</a:t>
+              <a:t>Clive Humby, 2006.</a:t>
             </a:r>
           </a:p>
           <a:p>
@@ -1553,61 +1511,8 @@
               <a:buAutoNum type="arabicPeriod"/>
             </a:pPr>
             <a:r>
-              <a:rPr lang="en-US" i="0" dirty="0"/>
-              <a:t>Structured data – contained in rows and columns – two types</a:t>
-            </a:r>
-          </a:p>
-          <a:p>
-            <a:pPr marL="699927" lvl="1" indent="-233309">
-              <a:buAutoNum type="arabicPeriod"/>
-            </a:pPr>
-            <a:r>
-              <a:rPr lang="en-US" i="0" dirty="0"/>
-              <a:t>Database management systems (Oracle, SQLServer, MySQL, and </a:t>
-            </a:r>
-            <a:r>
-              <a:rPr lang="en-US" i="0" dirty="0" err="1"/>
-              <a:t>PostGres</a:t>
-            </a:r>
-            <a:r>
-              <a:rPr lang="en-US" i="0" dirty="0"/>
-              <a:t>)</a:t>
-            </a:r>
-          </a:p>
-          <a:p>
-            <a:pPr marL="699927" lvl="1" indent="-233309">
-              <a:buAutoNum type="arabicPeriod"/>
-            </a:pPr>
-            <a:r>
-              <a:rPr lang="en-US" i="0" dirty="0"/>
-              <a:t>Repetitive data (sensor output, telephone call records, metered data, etc…)</a:t>
-            </a:r>
-          </a:p>
-          <a:p>
-            <a:pPr marL="233309" indent="-233309">
-              <a:buAutoNum type="arabicPeriod"/>
-            </a:pPr>
-            <a:r>
               <a:rPr lang="en-US" dirty="0"/>
-              <a:t>Unstructured data – not contained in row-column databases – each record is unique – two types</a:t>
-            </a:r>
-          </a:p>
-          <a:p>
-            <a:pPr marL="699927" lvl="1" indent="-233309">
-              <a:buAutoNum type="arabicPeriod"/>
-            </a:pPr>
-            <a:r>
-              <a:rPr lang="en-US" dirty="0"/>
-              <a:t>Textual – emails, transcribed conversations, literary texts</a:t>
-            </a:r>
-          </a:p>
-          <a:p>
-            <a:pPr marL="699927" lvl="1" indent="-233309">
-              <a:buAutoNum type="arabicPeriod"/>
-            </a:pPr>
-            <a:r>
-              <a:rPr lang="en-US" dirty="0"/>
-              <a:t>Non-Textual – images, video, and audio recordings</a:t>
+              <a:t>Data powers deep learning AI systems</a:t>
             </a:r>
           </a:p>
           <a:p>
@@ -1628,58 +1533,11 @@
           <a:p>
             <a:r>
               <a:rPr lang="en-US" dirty="0"/>
-              <a:t>In his book, </a:t>
-            </a:r>
-            <a:r>
-              <a:rPr lang="en-US" i="1" dirty="0"/>
-              <a:t>Data Architecture: A Primer for the Data Scientist, </a:t>
-            </a:r>
-            <a:r>
-              <a:rPr lang="en-US" i="0" dirty="0"/>
-              <a:t>Bill Inman makes a distinction between two foundational types of data – between structured data and its unstructured counterpart.  A</a:t>
-            </a:r>
-            <a:r>
-              <a:rPr lang="en-US" dirty="0"/>
-              <a:t>s he points out, most of the world’s data is unstructured.  So, what’s the difference between the two? </a:t>
+              <a:t>In 2006, a British entrepreneur named Clive Humby coined the phrase “Data is the new oil.”  Data powers A.I. systems, and it comes in a variety of formats.  Thus, data is a logical starting point for thinking about AI.  So, what kinds of data are you presently working with?  </a:t>
             </a:r>
           </a:p>
           <a:p>
             <a:endParaRPr lang="en-US" dirty="0"/>
-          </a:p>
-          <a:p>
-            <a:r>
-              <a:rPr lang="en-US" b="0" i="0" dirty="0">
-                <a:solidFill>
-                  <a:srgbClr val="333333"/>
-                </a:solidFill>
-                <a:effectLst/>
-                <a:latin typeface="Georgia" panose="02040502050405020303" pitchFamily="18" charset="0"/>
-              </a:rPr>
-              <a:t>Structured data is easy to search and organize because it is usually contained in rows and columns and its elements can be mapped into fixed, pre-defined fields.  </a:t>
-            </a:r>
-            <a:r>
-              <a:rPr lang="en-US" dirty="0"/>
-              <a:t>Structured data is of two types.  The first type is data which comes from a database management system – Oracle, SQLServer, etc…  The Epic healthcare system – used by UF Health – is a structured data source, though it also stores unstructured text data in the form of physician notes.  The second is repetitive data, consisting of structured records coming from a variety of non-database sources.  Some examples of repetitive data include sensor output, telephone call records, metered data, and so forth. </a:t>
-            </a:r>
-          </a:p>
-          <a:p>
-            <a:endParaRPr lang="en-US" dirty="0"/>
-          </a:p>
-          <a:p>
-            <a:r>
-              <a:rPr lang="en-US" b="0" i="0" dirty="0">
-                <a:solidFill>
-                  <a:srgbClr val="333333"/>
-                </a:solidFill>
-                <a:effectLst/>
-                <a:latin typeface="Georgia" panose="02040502050405020303" pitchFamily="18" charset="0"/>
-              </a:rPr>
-              <a:t>Unstructured data is data that cannot be contained in a row-column database and does not have an associated data model.  Each record is unique in terms of its structure and content.  Now t</a:t>
-            </a:r>
-            <a:r>
-              <a:rPr lang="en-US" dirty="0"/>
-              <a:t>here are two types of unstructured data – textual and non-textual.  Examples of textual data include emails, transcribed conversations, literary texts, and so on.  Non-textual data includes images, video, and audio recordings.</a:t>
-            </a:r>
           </a:p>
         </p:txBody>
       </p:sp>
@@ -1709,7 +1567,7 @@
     </p:spTree>
     <p:extLst>
       <p:ext uri="{BB962C8B-B14F-4D97-AF65-F5344CB8AC3E}">
-        <p14:creationId xmlns:p14="http://schemas.microsoft.com/office/powerpoint/2010/main" val="107510316"/>
+        <p14:creationId xmlns:p14="http://schemas.microsoft.com/office/powerpoint/2010/main" val="2921774388"/>
       </p:ext>
     </p:extLst>
   </p:cSld>
@@ -1768,16 +1626,89 @@
             </a:pPr>
             <a:r>
               <a:rPr lang="en-US" dirty="0"/>
-              <a:t>Review acronyms in Methods column</a:t>
-            </a:r>
-          </a:p>
-          <a:p>
-            <a:endParaRPr lang="en-US" dirty="0"/>
+              <a:t>Bill Inman – </a:t>
+            </a:r>
+            <a:r>
+              <a:rPr lang="en-US" i="1" dirty="0"/>
+              <a:t>Data Architecture: A Primer for the Data Scientist – </a:t>
+            </a:r>
+            <a:r>
+              <a:rPr lang="en-US" i="0" dirty="0"/>
+              <a:t>structured / unstructured data – most data is unstructured</a:t>
+            </a:r>
+          </a:p>
+          <a:p>
+            <a:pPr marL="233309" indent="-233309">
+              <a:buAutoNum type="arabicPeriod"/>
+            </a:pPr>
+            <a:r>
+              <a:rPr lang="en-US" i="0" dirty="0"/>
+              <a:t>Structured data – contained in rows and columns – two types</a:t>
+            </a:r>
+          </a:p>
+          <a:p>
+            <a:pPr marL="699927" lvl="1" indent="-233309">
+              <a:buAutoNum type="arabicPeriod"/>
+            </a:pPr>
+            <a:r>
+              <a:rPr lang="en-US" i="0" dirty="0"/>
+              <a:t>Database management systems (Oracle, SQLServer, MySQL, and </a:t>
+            </a:r>
+            <a:r>
+              <a:rPr lang="en-US" i="0" dirty="0" err="1"/>
+              <a:t>PostGres</a:t>
+            </a:r>
+            <a:r>
+              <a:rPr lang="en-US" i="0" dirty="0"/>
+              <a:t>)</a:t>
+            </a:r>
+          </a:p>
+          <a:p>
+            <a:pPr marL="699927" lvl="1" indent="-233309">
+              <a:buAutoNum type="arabicPeriod"/>
+            </a:pPr>
+            <a:r>
+              <a:rPr lang="en-US" i="0" dirty="0"/>
+              <a:t>Repetitive data (sensor output, telephone call records, metered data, etc…)</a:t>
+            </a:r>
+          </a:p>
+          <a:p>
+            <a:pPr marL="233309" indent="-233309">
+              <a:buAutoNum type="arabicPeriod"/>
+            </a:pPr>
+            <a:r>
+              <a:rPr lang="en-US" dirty="0"/>
+              <a:t>Unstructured data – not contained in row-column databases – each record is unique – two types</a:t>
+            </a:r>
+          </a:p>
+          <a:p>
+            <a:pPr marL="699927" lvl="1" indent="-233309">
+              <a:buAutoNum type="arabicPeriod"/>
+            </a:pPr>
+            <a:r>
+              <a:rPr lang="en-US" dirty="0"/>
+              <a:t>Textual – emails, transcribed conversations, literary texts</a:t>
+            </a:r>
+          </a:p>
+          <a:p>
+            <a:pPr marL="699927" lvl="1" indent="-233309">
+              <a:buAutoNum type="arabicPeriod"/>
+            </a:pPr>
+            <a:r>
+              <a:rPr lang="en-US" dirty="0"/>
+              <a:t>Non-Textual – images, video, and audio recordings</a:t>
+            </a:r>
           </a:p>
           <a:p>
             <a:pPr defTabSz="933237">
               <a:defRPr/>
             </a:pPr>
+            <a:endParaRPr lang="en-US" dirty="0"/>
+          </a:p>
+          <a:p>
+            <a:pPr defTabSz="933237">
+              <a:defRPr/>
+            </a:pPr>
             <a:r>
               <a:rPr lang="en-US" dirty="0"/>
               <a:t>=====</a:t>
@@ -1786,7 +1717,19 @@
           <a:p>
             <a:r>
               <a:rPr lang="en-US" dirty="0"/>
-              <a:t>With our primary data sources identified, let’s organize everything in a table.  On the leftmost column, our data sources are listed, followed by a column of generic questions we might like to ask of our data, another column which lists the related AI task for each question, and finally a column of AI methods and technologies.  This table, then, becomes a roadmap to guide your AI learning.  The question and AI task columns are self-explanatory, but I’d like to take a few seconds to unpack the abbreviations in the Methods column.  Don’t worry about the vocabulary at this point as these terms will be defined in our workshops.  But let’s quickly run through the acronyms in the Methods column.  NLP – Natural Language Processing; RNN – Recurrent Neural Network;  CNN – Convolutional Neural Network; GAN – Generative Adversarial Network;  RAPIDS – Nvidia’s data science framework;  Transformer – A new kind of neural network.</a:t>
+              <a:t>In his book, </a:t>
+            </a:r>
+            <a:r>
+              <a:rPr lang="en-US" i="1" dirty="0"/>
+              <a:t>Data Architecture: A Primer for the Data Scientist, </a:t>
+            </a:r>
+            <a:r>
+              <a:rPr lang="en-US" i="0" dirty="0"/>
+              <a:t>Bill Inman makes a distinction between two foundational types of data – between structured data and its unstructured counterpart.  A</a:t>
+            </a:r>
+            <a:r>
+              <a:rPr lang="en-US" dirty="0"/>
+              <a:t>s he points out, most of the world’s data is unstructured.  So, what’s the difference between the two? </a:t>
             </a:r>
           </a:p>
           <a:p>
@@ -1794,18 +1737,38 @@
           </a:p>
           <a:p>
             <a:r>
+              <a:rPr lang="en-US" b="0" i="0" dirty="0">
+                <a:solidFill>
+                  <a:srgbClr val="333333"/>
+                </a:solidFill>
+                <a:effectLst/>
+                <a:latin typeface="Georgia" panose="02040502050405020303" pitchFamily="18" charset="0"/>
+              </a:rPr>
+              <a:t>Structured data is easy to search and organize because it is usually contained in rows and columns and its elements can be mapped into fixed, pre-defined fields.  </a:t>
+            </a:r>
+            <a:r>
               <a:rPr lang="en-US" dirty="0"/>
-              <a:t>We will now consider each data source, the types of questions one can ask of each, and the associated AI methods. </a:t>
+              <a:t>Structured data is of two types.  The first type is data which comes from a database management system – Oracle, SQLServer, etc…  The Epic healthcare system – used by UF Health – is a structured data source, though it also stores unstructured text data in the form of physician notes.  The second is repetitive data, consisting of structured records coming from a variety of non-database sources.  Some examples of repetitive data include sensor output, telephone call records, metered data, and so forth. </a:t>
             </a:r>
           </a:p>
           <a:p>
             <a:endParaRPr lang="en-US" dirty="0"/>
           </a:p>
           <a:p>
-            <a:endParaRPr lang="en-US" dirty="0"/>
-          </a:p>
-          <a:p>
-            <a:endParaRPr lang="en-US" dirty="0"/>
+            <a:r>
+              <a:rPr lang="en-US" b="0" i="0" dirty="0">
+                <a:solidFill>
+                  <a:srgbClr val="333333"/>
+                </a:solidFill>
+                <a:effectLst/>
+                <a:latin typeface="Georgia" panose="02040502050405020303" pitchFamily="18" charset="0"/>
+              </a:rPr>
+              <a:t>Unstructured data is data that cannot be contained in a row-column database and does not have an associated data model.  Each record is unique in terms of its structure and content.  Now t</a:t>
+            </a:r>
+            <a:r>
+              <a:rPr lang="en-US" dirty="0"/>
+              <a:t>here are two types of unstructured data – textual and non-textual.  Examples of textual data include emails, transcribed conversations, literary texts, and so on.  Non-textual data includes images, video, and audio recordings.</a:t>
+            </a:r>
           </a:p>
         </p:txBody>
       </p:sp>
@@ -1835,7 +1798,7 @@
     </p:spTree>
     <p:extLst>
       <p:ext uri="{BB962C8B-B14F-4D97-AF65-F5344CB8AC3E}">
-        <p14:creationId xmlns:p14="http://schemas.microsoft.com/office/powerpoint/2010/main" val="1003415448"/>
+        <p14:creationId xmlns:p14="http://schemas.microsoft.com/office/powerpoint/2010/main" val="107510316"/>
       </p:ext>
     </p:extLst>
   </p:cSld>
@@ -1889,83 +1852,10 @@
           <a:bodyPr/>
           <a:lstStyle/>
           <a:p>
-            <a:pPr marL="228600" indent="-228600" defTabSz="933237">
-              <a:buAutoNum type="arabicPeriod"/>
-              <a:defRPr/>
-            </a:pPr>
             <a:r>
               <a:rPr lang="en-US" dirty="0"/>
-              <a:t>Nvidia’s RAPIDS development environment best for structured data</a:t>
-            </a:r>
-          </a:p>
-          <a:p>
-            <a:pPr marL="685800" lvl="1" indent="-228600" defTabSz="933237">
-              <a:buAutoNum type="arabicPeriod"/>
-              <a:defRPr/>
-            </a:pPr>
-            <a:r>
-              <a:rPr lang="en-US" dirty="0"/>
-              <a:t>cuDF similar to popular Pandas library</a:t>
-            </a:r>
-          </a:p>
-          <a:p>
-            <a:pPr marL="685800" lvl="1" indent="-228600" defTabSz="933237">
-              <a:buAutoNum type="arabicPeriod"/>
-              <a:defRPr/>
-            </a:pPr>
-            <a:r>
-              <a:rPr lang="en-US" dirty="0"/>
-              <a:t>Support for dataframes, data cleaning, and data management</a:t>
-            </a:r>
-          </a:p>
-          <a:p>
-            <a:pPr marL="685800" lvl="1" indent="-228600" defTabSz="933237">
-              <a:buAutoNum type="arabicPeriod"/>
-              <a:defRPr/>
-            </a:pPr>
-            <a:r>
-              <a:rPr lang="en-US" dirty="0"/>
-              <a:t>Huge performance boost – 10 to 100 times faster</a:t>
-            </a:r>
-          </a:p>
-          <a:p>
-            <a:pPr defTabSz="933237">
-              <a:defRPr/>
-            </a:pPr>
-            <a:endParaRPr lang="en-US" dirty="0"/>
-          </a:p>
-          <a:p>
-            <a:pPr defTabSz="933237">
-              <a:defRPr/>
-            </a:pPr>
-            <a:r>
-              <a:rPr lang="en-US" dirty="0"/>
-              <a:t>=====</a:t>
-            </a:r>
-          </a:p>
-          <a:p>
-            <a:pPr defTabSz="933237">
-              <a:defRPr/>
-            </a:pPr>
-            <a:r>
-              <a:rPr lang="en-US" dirty="0"/>
-              <a:t>In the case of structured data – data derived from databases or repetitive data from sensors – the Nvidia RAPIDS development environment is your best starting point.  RAPIDS provides a set of useful libraries, with machine learning functions for almost any research task.  The RAPIDS cuDF library, for example, is equivalent to the popular Pandas library which supports dataframes as well as basic data management and cleaning.   </a:t>
-            </a:r>
-          </a:p>
-          <a:p>
-            <a:pPr defTabSz="933237">
-              <a:defRPr/>
-            </a:pPr>
-            <a:endParaRPr lang="en-US" dirty="0"/>
-          </a:p>
-          <a:p>
-            <a:pPr defTabSz="933237">
-              <a:defRPr/>
-            </a:pPr>
-            <a:endParaRPr lang="en-US" dirty="0"/>
-          </a:p>
-          <a:p>
-            <a:endParaRPr lang="en-US" dirty="0"/>
+              <a:t>Methods and techniques fall into two primary categories – machine learning and deep learning.  ML algorithms rose to prominence in the 1990’s, with advances in computer hardware.  Deep learning, on the other hand, came into its own shortly after 2010.  This second revolution was powered by Graphic Processing Units (GPUs), plentiful data, and deep learning frameworks – first Tensorflow and then Pytorch.  </a:t>
+            </a:r>
           </a:p>
         </p:txBody>
       </p:sp>
@@ -1995,7 +1885,7 @@
     </p:spTree>
     <p:extLst>
       <p:ext uri="{BB962C8B-B14F-4D97-AF65-F5344CB8AC3E}">
-        <p14:creationId xmlns:p14="http://schemas.microsoft.com/office/powerpoint/2010/main" val="268399345"/>
+        <p14:creationId xmlns:p14="http://schemas.microsoft.com/office/powerpoint/2010/main" val="3009881722"/>
       </p:ext>
     </p:extLst>
   </p:cSld>
@@ -2223,7 +2113,7 @@
             </a:pPr>
             <a:r>
               <a:rPr lang="en-US" dirty="0"/>
-              <a:t>Text generating GANs are a unique animal, different from GANs used to generate images</a:t>
+              <a:t>Review acronyms in Methods column</a:t>
             </a:r>
           </a:p>
           <a:p>
@@ -2241,14 +2131,17 @@
           <a:p>
             <a:r>
               <a:rPr lang="en-US" dirty="0"/>
-              <a:t>With text data, transformers and recurrent neural networks are established deep learning technologies, appropriate for detection, classification, segmentation, recommendation, and creation tasks.  These will solve most text problems, or at least get you started in the right direction.  Generative Adversarial Networks or GANs are another choice.  However, keep in mind that text generating GANs are a unique animal, different and distinct from GANs used to generate images.</a:t>
+              <a:t>With our primary data sources identified, let’s organize everything in a table.  On the leftmost column, our data sources are listed, followed by a column of generic questions we might like to ask of our data, another column which lists the related AI task for each question, and finally a column of AI methods and technologies.  This table, then, becomes a roadmap to guide your AI learning.  The question and AI task columns are self-explanatory, but I’d like to take a few seconds to unpack the abbreviations in the Methods column.  Don’t worry about the vocabulary at this point as these terms will be defined in our workshops.  But let’s quickly run through the acronyms in the Methods column.  NLP – Natural Language Processing; RNN – Recurrent Neural Network;  CNN – Convolutional Neural Network; GAN – Generative Adversarial Network;  RAPIDS – Nvidia’s data science framework;  Transformer – A new kind of neural network.</a:t>
             </a:r>
           </a:p>
           <a:p>
             <a:endParaRPr lang="en-US" dirty="0"/>
           </a:p>
           <a:p>
-            <a:endParaRPr lang="en-US" dirty="0"/>
+            <a:r>
+              <a:rPr lang="en-US" dirty="0"/>
+              <a:t>We will now consider each data source, the types of questions one can ask of each, and the associated AI methods. </a:t>
+            </a:r>
           </a:p>
           <a:p>
             <a:endParaRPr lang="en-US" dirty="0"/>
@@ -2287,7 +2180,7 @@
     </p:spTree>
     <p:extLst>
       <p:ext uri="{BB962C8B-B14F-4D97-AF65-F5344CB8AC3E}">
-        <p14:creationId xmlns:p14="http://schemas.microsoft.com/office/powerpoint/2010/main" val="132608395"/>
+        <p14:creationId xmlns:p14="http://schemas.microsoft.com/office/powerpoint/2010/main" val="1003415448"/>
       </p:ext>
     </p:extLst>
   </p:cSld>
@@ -2341,66 +2234,80 @@
           <a:bodyPr/>
           <a:lstStyle/>
           <a:p>
-            <a:pPr marL="233309" indent="-233309">
+            <a:pPr marL="228600" indent="-228600" defTabSz="933237">
               <a:buAutoNum type="arabicPeriod"/>
+              <a:defRPr/>
             </a:pPr>
             <a:r>
               <a:rPr lang="en-US" dirty="0"/>
-              <a:t>Convolutional neural networks – bread and butter of image work.</a:t>
-            </a:r>
-          </a:p>
-          <a:p>
-            <a:pPr marL="233309" indent="-233309">
+              <a:t>Nvidia’s RAPIDS development environment best for structured data</a:t>
+            </a:r>
+          </a:p>
+          <a:p>
+            <a:pPr marL="685800" lvl="1" indent="-228600" defTabSz="933237">
               <a:buAutoNum type="arabicPeriod"/>
+              <a:defRPr/>
             </a:pPr>
             <a:r>
               <a:rPr lang="en-US" dirty="0"/>
-              <a:t>Recent development -- transformers + GANs = TransGAN.</a:t>
-            </a:r>
-          </a:p>
-          <a:p>
-            <a:pPr marL="233309" indent="-233309">
+              <a:t>cuDF similar to popular Pandas library</a:t>
+            </a:r>
+          </a:p>
+          <a:p>
+            <a:pPr marL="685800" lvl="1" indent="-228600" defTabSz="933237">
               <a:buAutoNum type="arabicPeriod"/>
+              <a:defRPr/>
             </a:pPr>
             <a:r>
               <a:rPr lang="en-US" dirty="0"/>
-              <a:t>Special models for single shot detection and real time object detection.</a:t>
-            </a:r>
-          </a:p>
-          <a:p>
-            <a:endParaRPr lang="en-US" dirty="0"/>
+              <a:t>Support for dataframes, data cleaning, and data management</a:t>
+            </a:r>
+          </a:p>
+          <a:p>
+            <a:pPr marL="685800" lvl="1" indent="-228600" defTabSz="933237">
+              <a:buAutoNum type="arabicPeriod"/>
+              <a:defRPr/>
+            </a:pPr>
+            <a:r>
+              <a:rPr lang="en-US" dirty="0"/>
+              <a:t>Huge performance boost – 10 to 100 times faster</a:t>
+            </a:r>
           </a:p>
           <a:p>
             <a:pPr defTabSz="933237">
               <a:defRPr/>
             </a:pPr>
+            <a:endParaRPr lang="en-US" dirty="0"/>
+          </a:p>
+          <a:p>
+            <a:pPr defTabSz="933237">
+              <a:defRPr/>
+            </a:pPr>
             <a:r>
               <a:rPr lang="en-US" dirty="0"/>
               <a:t>=====</a:t>
             </a:r>
           </a:p>
           <a:p>
+            <a:pPr defTabSz="933237">
+              <a:defRPr/>
+            </a:pPr>
             <a:r>
               <a:rPr lang="en-US" dirty="0"/>
-              <a:t>Convolutional neural networks (CNNs) have been the bread and butter of the image world for some time now.  In short, CNNs do it all.  For image creation, GANs continue to be the tool of choice, typically constructed with CNN components.  Another recent development has been the merging of transformers and GANs, with TransGAN being a prominent example.</a:t>
-            </a:r>
-          </a:p>
-          <a:p>
+              <a:t>In the case of structured data – data derived from databases or repetitive data from sensors – the Nvidia RAPIDS development environment is your best starting point.  RAPIDS provides a set of useful libraries, with machine learning functions for almost any research task.  The RAPIDS cuDF library, for example, is equivalent to the popular Pandas library which supports dataframes as well as basic data management and cleaning.   </a:t>
+            </a:r>
+          </a:p>
+          <a:p>
+            <a:pPr defTabSz="933237">
+              <a:defRPr/>
+            </a:pPr>
             <a:endParaRPr lang="en-US" dirty="0"/>
           </a:p>
           <a:p>
-            <a:r>
-              <a:rPr lang="en-US" dirty="0"/>
-              <a:t>For detection, consider </a:t>
-            </a:r>
-            <a:r>
-              <a:rPr lang="en-US" b="1" dirty="0"/>
-              <a:t>single shot detection models </a:t>
-            </a:r>
-            <a:r>
-              <a:rPr lang="en-US" dirty="0"/>
-              <a:t>(SSDs) or YOLO (real-time object detection).  Faster-RCNN or EfficientDet are also options, depending on the computational resources available.  Classification is a typical CNN task, with ResNet and its variants being popular.  And finally – for segmentation tasks – Mask-RCNN or Unet ought to be considered.  </a:t>
-            </a:r>
+            <a:pPr defTabSz="933237">
+              <a:defRPr/>
+            </a:pPr>
+            <a:endParaRPr lang="en-US" dirty="0"/>
           </a:p>
           <a:p>
             <a:endParaRPr lang="en-US" dirty="0"/>
@@ -2433,7 +2340,7 @@
     </p:spTree>
     <p:extLst>
       <p:ext uri="{BB962C8B-B14F-4D97-AF65-F5344CB8AC3E}">
-        <p14:creationId xmlns:p14="http://schemas.microsoft.com/office/powerpoint/2010/main" val="3841188136"/>
+        <p14:creationId xmlns:p14="http://schemas.microsoft.com/office/powerpoint/2010/main" val="268399345"/>
       </p:ext>
     </p:extLst>
   </p:cSld>
@@ -2492,37 +2399,16 @@
             </a:pPr>
             <a:r>
               <a:rPr lang="en-US" dirty="0"/>
-              <a:t>Video data is unique in that it is a time series of images</a:t>
-            </a:r>
-          </a:p>
-          <a:p>
-            <a:pPr marL="233309" indent="-233309">
-              <a:buAutoNum type="arabicPeriod"/>
-            </a:pPr>
-            <a:r>
-              <a:rPr lang="en-US" dirty="0"/>
-              <a:t>CNNs paired with RNNs as there is both temporal and spatial characteristics</a:t>
-            </a:r>
-          </a:p>
-          <a:p>
-            <a:pPr marL="233309" indent="-233309">
-              <a:buAutoNum type="arabicPeriod"/>
-            </a:pPr>
-            <a:r>
-              <a:rPr lang="en-US" dirty="0"/>
-              <a:t>New development is video GANs which generate new frames, one by one – Cutting edge technology</a:t>
-            </a:r>
+              <a:t>Text generating GANs are a unique animal, different from GANs used to generate images</a:t>
+            </a:r>
+          </a:p>
+          <a:p>
+            <a:endParaRPr lang="en-US" dirty="0"/>
           </a:p>
           <a:p>
             <a:pPr defTabSz="933237">
               <a:defRPr/>
             </a:pPr>
-            <a:endParaRPr lang="en-US" dirty="0"/>
-          </a:p>
-          <a:p>
-            <a:pPr defTabSz="933237">
-              <a:defRPr/>
-            </a:pPr>
             <a:r>
               <a:rPr lang="en-US" dirty="0"/>
               <a:t>=====</a:t>
@@ -2531,8 +2417,14 @@
           <a:p>
             <a:r>
               <a:rPr lang="en-US" dirty="0"/>
-              <a:t>Video data is unique, being a time series of images.  As with image data, convolutional neural networks have captured most of this market, though CNNs are frequently paired with RNNs as there is both temporal and spatial characteristics in each image frame.  With video, single and multi-object tracking is also possible.  Interestingly, there are now video GANs, which basically build frame by frame what it thinks the video should look like.  This is cutting-edge technology.</a:t>
-            </a:r>
+              <a:t>With text data, transformers and recurrent neural networks are established deep learning technologies, appropriate for detection, classification, segmentation, recommendation, and creation tasks.  These will solve most text problems, or at least get you started in the right direction.  Generative Adversarial Networks or GANs are another choice.  However, keep in mind that text generating GANs are a unique animal, different and distinct from GANs used to generate images.</a:t>
+            </a:r>
+          </a:p>
+          <a:p>
+            <a:endParaRPr lang="en-US" dirty="0"/>
+          </a:p>
+          <a:p>
+            <a:endParaRPr lang="en-US" dirty="0"/>
           </a:p>
           <a:p>
             <a:endParaRPr lang="en-US" dirty="0"/>
@@ -2571,7 +2463,7 @@
     </p:spTree>
     <p:extLst>
       <p:ext uri="{BB962C8B-B14F-4D97-AF65-F5344CB8AC3E}">
-        <p14:creationId xmlns:p14="http://schemas.microsoft.com/office/powerpoint/2010/main" val="2566424567"/>
+        <p14:creationId xmlns:p14="http://schemas.microsoft.com/office/powerpoint/2010/main" val="132608395"/>
       </p:ext>
     </p:extLst>
   </p:cSld>
@@ -2630,7 +2522,7 @@
             </a:pPr>
             <a:r>
               <a:rPr lang="en-US" dirty="0"/>
-              <a:t>Audio interesting format </a:t>
+              <a:t>Convolutional neural networks – bread and butter of image work.</a:t>
             </a:r>
           </a:p>
           <a:p>
@@ -2639,7 +2531,7 @@
             </a:pPr>
             <a:r>
               <a:rPr lang="en-US" dirty="0"/>
-              <a:t>MEL spectrum representation – 2D spectrogram of a recording</a:t>
+              <a:t>Special models for single shot detection and real time object detection.</a:t>
             </a:r>
           </a:p>
           <a:p>
@@ -2648,19 +2540,16 @@
             </a:pPr>
             <a:r>
               <a:rPr lang="en-US" dirty="0"/>
-              <a:t>Audio is time series, just like video</a:t>
-            </a:r>
+              <a:t>Recent development – transformers + GANs = TransGAN.  Also, diffusion models are gaining traction.</a:t>
+            </a:r>
+          </a:p>
+          <a:p>
+            <a:endParaRPr lang="en-US" dirty="0"/>
           </a:p>
           <a:p>
             <a:pPr defTabSz="933237">
               <a:defRPr/>
             </a:pPr>
-            <a:endParaRPr lang="en-US" dirty="0"/>
-          </a:p>
-          <a:p>
-            <a:pPr defTabSz="933237">
-              <a:defRPr/>
-            </a:pPr>
             <a:r>
               <a:rPr lang="en-US" dirty="0"/>
               <a:t>=====</a:t>
@@ -2669,14 +2558,25 @@
           <a:p>
             <a:r>
               <a:rPr lang="en-US" dirty="0"/>
-              <a:t>Audio is another interesting format.  Many audio methods are derived from a MEL spectrum representation, a 2D spectrogram of the recording.  Like video, audio is also a time series.  Transformers, CNNs, RNNs, and GANs can all be used with audio data.  Now that we have covered the various types of data and their associated methods, it’s time to do something practical.</a:t>
+              <a:t>Convolutional neural networks (CNNs) have been the bread and butter of the image world for some time now.  In short, CNNs do it all.  For image creation, GANs continue to be the tool of choice, typically constructed with CNN components.  Another recent development has been the merging of transformers and GANs, with TransGAN being a prominent example.</a:t>
             </a:r>
           </a:p>
           <a:p>
             <a:endParaRPr lang="en-US" dirty="0"/>
           </a:p>
           <a:p>
-            <a:endParaRPr lang="en-US" dirty="0"/>
+            <a:r>
+              <a:rPr lang="en-US" dirty="0"/>
+              <a:t>For detection, consider </a:t>
+            </a:r>
+            <a:r>
+              <a:rPr lang="en-US" b="1" dirty="0"/>
+              <a:t>single shot detection models </a:t>
+            </a:r>
+            <a:r>
+              <a:rPr lang="en-US" dirty="0"/>
+              <a:t>(SSDs) or YOLO (real-time object detection).  Faster-RCNN or EfficientDet are also options, depending on the computational resources available.  Classification is a typical CNN task, with ResNet and its variants being popular.  And finally – for segmentation tasks – Mask-RCNN or Unet ought to be considered.  </a:t>
+            </a:r>
           </a:p>
           <a:p>
             <a:endParaRPr lang="en-US" dirty="0"/>
@@ -2709,7 +2609,7 @@
     </p:spTree>
     <p:extLst>
       <p:ext uri="{BB962C8B-B14F-4D97-AF65-F5344CB8AC3E}">
-        <p14:creationId xmlns:p14="http://schemas.microsoft.com/office/powerpoint/2010/main" val="2786040527"/>
+        <p14:creationId xmlns:p14="http://schemas.microsoft.com/office/powerpoint/2010/main" val="3841188136"/>
       </p:ext>
     </p:extLst>
   </p:cSld>
@@ -2763,10 +2663,58 @@
           <a:bodyPr/>
           <a:lstStyle/>
           <a:p>
+            <a:pPr marL="233309" indent="-233309">
+              <a:buAutoNum type="arabicPeriod"/>
+            </a:pPr>
             <a:r>
               <a:rPr lang="en-US" dirty="0"/>
-              <a:t>We have now arrived at our hands-on activity.  Let’s take a poll, I would like for you to describe the data you’re currently working with and possible AI methods to use on that data.  Grab a pen and a pad of paper or fire up your word processor and write out a response.</a:t>
-            </a:r>
+              <a:t>Video data is unique in that it is a time series of images</a:t>
+            </a:r>
+          </a:p>
+          <a:p>
+            <a:pPr marL="233309" indent="-233309">
+              <a:buAutoNum type="arabicPeriod"/>
+            </a:pPr>
+            <a:r>
+              <a:rPr lang="en-US" dirty="0"/>
+              <a:t>CNNs paired with RNNs as there is both temporal and spatial characteristics</a:t>
+            </a:r>
+          </a:p>
+          <a:p>
+            <a:pPr marL="233309" indent="-233309">
+              <a:buAutoNum type="arabicPeriod"/>
+            </a:pPr>
+            <a:r>
+              <a:rPr lang="en-US" dirty="0"/>
+              <a:t>New development is video GANs which generate new frames, one by one – Cutting edge technology</a:t>
+            </a:r>
+          </a:p>
+          <a:p>
+            <a:pPr defTabSz="933237">
+              <a:defRPr/>
+            </a:pPr>
+            <a:endParaRPr lang="en-US" dirty="0"/>
+          </a:p>
+          <a:p>
+            <a:pPr defTabSz="933237">
+              <a:defRPr/>
+            </a:pPr>
+            <a:r>
+              <a:rPr lang="en-US" dirty="0"/>
+              <a:t>=====</a:t>
+            </a:r>
+          </a:p>
+          <a:p>
+            <a:r>
+              <a:rPr lang="en-US" dirty="0"/>
+              <a:t>Video data is unique, being a time series of images.  As with image data, convolutional neural networks have captured most of this market, though CNNs are frequently paired with RNNs as there is both temporal and spatial characteristics in each image frame.  With video, single and multi-object tracking is also possible.  Interestingly, there are now video GANs, which basically build frame by frame what it thinks the video should look like.  This is cutting-edge technology.</a:t>
+            </a:r>
+          </a:p>
+          <a:p>
+            <a:endParaRPr lang="en-US" dirty="0"/>
+          </a:p>
+          <a:p>
+            <a:endParaRPr lang="en-US" dirty="0"/>
           </a:p>
           <a:p>
             <a:endParaRPr lang="en-US" dirty="0"/>
@@ -2799,7 +2747,7 @@
     </p:spTree>
     <p:extLst>
       <p:ext uri="{BB962C8B-B14F-4D97-AF65-F5344CB8AC3E}">
-        <p14:creationId xmlns:p14="http://schemas.microsoft.com/office/powerpoint/2010/main" val="4235018632"/>
+        <p14:creationId xmlns:p14="http://schemas.microsoft.com/office/powerpoint/2010/main" val="2566424567"/>
       </p:ext>
     </p:extLst>
   </p:cSld>
@@ -2853,6 +2801,60 @@
           <a:bodyPr/>
           <a:lstStyle/>
           <a:p>
+            <a:pPr marL="233309" indent="-233309">
+              <a:buAutoNum type="arabicPeriod"/>
+            </a:pPr>
+            <a:r>
+              <a:rPr lang="en-US" dirty="0"/>
+              <a:t>Audio interesting format </a:t>
+            </a:r>
+          </a:p>
+          <a:p>
+            <a:pPr marL="233309" indent="-233309">
+              <a:buAutoNum type="arabicPeriod"/>
+            </a:pPr>
+            <a:r>
+              <a:rPr lang="en-US" dirty="0"/>
+              <a:t>MEL spectrum representation – 2D spectrogram of a recording</a:t>
+            </a:r>
+          </a:p>
+          <a:p>
+            <a:pPr marL="233309" indent="-233309">
+              <a:buAutoNum type="arabicPeriod"/>
+            </a:pPr>
+            <a:r>
+              <a:rPr lang="en-US" dirty="0"/>
+              <a:t>Audio is time series, just like video</a:t>
+            </a:r>
+          </a:p>
+          <a:p>
+            <a:pPr defTabSz="933237">
+              <a:defRPr/>
+            </a:pPr>
+            <a:endParaRPr lang="en-US" dirty="0"/>
+          </a:p>
+          <a:p>
+            <a:pPr defTabSz="933237">
+              <a:defRPr/>
+            </a:pPr>
+            <a:r>
+              <a:rPr lang="en-US" dirty="0"/>
+              <a:t>=====</a:t>
+            </a:r>
+          </a:p>
+          <a:p>
+            <a:r>
+              <a:rPr lang="en-US" dirty="0"/>
+              <a:t>Audio is another interesting format.  Many audio methods are derived from a MEL spectrum representation, a 2D spectrogram of the recording.  Like video, audio is also a time series.  Transformers, CNNs, RNNs, and GANs can all be used with audio data.  Now that we have covered the various types of data and their associated methods, it’s time to do something practical.</a:t>
+            </a:r>
+          </a:p>
+          <a:p>
+            <a:endParaRPr lang="en-US" dirty="0"/>
+          </a:p>
+          <a:p>
+            <a:endParaRPr lang="en-US" dirty="0"/>
+          </a:p>
+          <a:p>
             <a:endParaRPr lang="en-US" dirty="0"/>
           </a:p>
         </p:txBody>
@@ -2883,7 +2885,7 @@
     </p:spTree>
     <p:extLst>
       <p:ext uri="{BB962C8B-B14F-4D97-AF65-F5344CB8AC3E}">
-        <p14:creationId xmlns:p14="http://schemas.microsoft.com/office/powerpoint/2010/main" val="672039410"/>
+        <p14:creationId xmlns:p14="http://schemas.microsoft.com/office/powerpoint/2010/main" val="2786040527"/>
       </p:ext>
     </p:extLst>
   </p:cSld>
@@ -2939,11 +2941,8 @@
           <a:p>
             <a:r>
               <a:rPr lang="en-US" dirty="0"/>
-              <a:t>And finally, do we have any questions?  </a:t>
-            </a:r>
-          </a:p>
-          <a:p>
-            <a:endParaRPr lang="en-US" dirty="0"/>
+              <a:t>The full AI-project lifecycle is shown here.  Interestingly, data-related activities usually consume about 80% of project time.  Given that fact, Andrew Ng – one of the world’s leading AI experts – recently launched a Data-Centric AI movement.  His argument is simple.  Data is the most important ingredient in a deep learning project.  And I agree.</a:t>
+            </a:r>
           </a:p>
         </p:txBody>
       </p:sp>
@@ -2965,6 +2964,189 @@
             <a:fld id="{3148858F-F1DB-4027-9C85-CCA6849540DD}" type="slidenum">
               <a:rPr lang="en-US" smtClean="0"/>
               <a:t>26</a:t>
+            </a:fld>
+            <a:endParaRPr lang="en-US"/>
+          </a:p>
+        </p:txBody>
+      </p:sp>
+    </p:spTree>
+    <p:extLst>
+      <p:ext uri="{BB962C8B-B14F-4D97-AF65-F5344CB8AC3E}">
+        <p14:creationId xmlns:p14="http://schemas.microsoft.com/office/powerpoint/2010/main" val="672039410"/>
+      </p:ext>
+    </p:extLst>
+  </p:cSld>
+  <p:clrMapOvr>
+    <a:masterClrMapping/>
+  </p:clrMapOvr>
+</p:notes>
+</file>
+
+<file path=ppt/notesSlides/notesSlide27.xml><?xml version="1.0" encoding="utf-8"?>
+<p:notes xmlns:a="http://schemas.openxmlformats.org/drawingml/2006/main" xmlns:r="http://schemas.openxmlformats.org/officeDocument/2006/relationships" xmlns:p="http://schemas.openxmlformats.org/presentationml/2006/main">
+  <p:cSld>
+    <p:spTree>
+      <p:nvGrpSpPr>
+        <p:cNvPr id="1" name=""/>
+        <p:cNvGrpSpPr/>
+        <p:nvPr/>
+      </p:nvGrpSpPr>
+      <p:grpSpPr>
+        <a:xfrm>
+          <a:off x="0" y="0"/>
+          <a:ext cx="0" cy="0"/>
+          <a:chOff x="0" y="0"/>
+          <a:chExt cx="0" cy="0"/>
+        </a:xfrm>
+      </p:grpSpPr>
+      <p:sp>
+        <p:nvSpPr>
+          <p:cNvPr id="2" name="Slide Image Placeholder 1"/>
+          <p:cNvSpPr>
+            <a:spLocks noGrp="1" noRot="1" noChangeAspect="1"/>
+          </p:cNvSpPr>
+          <p:nvPr>
+            <p:ph type="sldImg"/>
+          </p:nvPr>
+        </p:nvSpPr>
+        <p:spPr/>
+      </p:sp>
+      <p:sp>
+        <p:nvSpPr>
+          <p:cNvPr id="3" name="Notes Placeholder 2"/>
+          <p:cNvSpPr>
+            <a:spLocks noGrp="1"/>
+          </p:cNvSpPr>
+          <p:nvPr>
+            <p:ph type="body" idx="1"/>
+          </p:nvPr>
+        </p:nvSpPr>
+        <p:spPr/>
+        <p:txBody>
+          <a:bodyPr/>
+          <a:lstStyle/>
+          <a:p>
+            <a:r>
+              <a:rPr lang="en-US" dirty="0"/>
+              <a:t>We have now arrived at our hands-on activity.  Take a minute to describe the AI project you’d like to execute.  What’s your question?  What machine learning or deep learning methods do you think are appropriate?  And what kind of data will you need to collect?</a:t>
+            </a:r>
+          </a:p>
+          <a:p>
+            <a:endParaRPr lang="en-US" dirty="0"/>
+          </a:p>
+          <a:p>
+            <a:endParaRPr lang="en-US" dirty="0"/>
+          </a:p>
+        </p:txBody>
+      </p:sp>
+      <p:sp>
+        <p:nvSpPr>
+          <p:cNvPr id="4" name="Slide Number Placeholder 3"/>
+          <p:cNvSpPr>
+            <a:spLocks noGrp="1"/>
+          </p:cNvSpPr>
+          <p:nvPr>
+            <p:ph type="sldNum" sz="quarter" idx="5"/>
+          </p:nvPr>
+        </p:nvSpPr>
+        <p:spPr/>
+        <p:txBody>
+          <a:bodyPr/>
+          <a:lstStyle/>
+          <a:p>
+            <a:fld id="{3148858F-F1DB-4027-9C85-CCA6849540DD}" type="slidenum">
+              <a:rPr lang="en-US" smtClean="0"/>
+              <a:t>27</a:t>
+            </a:fld>
+            <a:endParaRPr lang="en-US"/>
+          </a:p>
+        </p:txBody>
+      </p:sp>
+    </p:spTree>
+    <p:extLst>
+      <p:ext uri="{BB962C8B-B14F-4D97-AF65-F5344CB8AC3E}">
+        <p14:creationId xmlns:p14="http://schemas.microsoft.com/office/powerpoint/2010/main" val="4235018632"/>
+      </p:ext>
+    </p:extLst>
+  </p:cSld>
+  <p:clrMapOvr>
+    <a:masterClrMapping/>
+  </p:clrMapOvr>
+</p:notes>
+</file>
+
+<file path=ppt/notesSlides/notesSlide28.xml><?xml version="1.0" encoding="utf-8"?>
+<p:notes xmlns:a="http://schemas.openxmlformats.org/drawingml/2006/main" xmlns:r="http://schemas.openxmlformats.org/officeDocument/2006/relationships" xmlns:p="http://schemas.openxmlformats.org/presentationml/2006/main">
+  <p:cSld>
+    <p:spTree>
+      <p:nvGrpSpPr>
+        <p:cNvPr id="1" name=""/>
+        <p:cNvGrpSpPr/>
+        <p:nvPr/>
+      </p:nvGrpSpPr>
+      <p:grpSpPr>
+        <a:xfrm>
+          <a:off x="0" y="0"/>
+          <a:ext cx="0" cy="0"/>
+          <a:chOff x="0" y="0"/>
+          <a:chExt cx="0" cy="0"/>
+        </a:xfrm>
+      </p:grpSpPr>
+      <p:sp>
+        <p:nvSpPr>
+          <p:cNvPr id="2" name="Slide Image Placeholder 1"/>
+          <p:cNvSpPr>
+            <a:spLocks noGrp="1" noRot="1" noChangeAspect="1"/>
+          </p:cNvSpPr>
+          <p:nvPr>
+            <p:ph type="sldImg"/>
+          </p:nvPr>
+        </p:nvSpPr>
+        <p:spPr/>
+      </p:sp>
+      <p:sp>
+        <p:nvSpPr>
+          <p:cNvPr id="3" name="Notes Placeholder 2"/>
+          <p:cNvSpPr>
+            <a:spLocks noGrp="1"/>
+          </p:cNvSpPr>
+          <p:nvPr>
+            <p:ph type="body" idx="1"/>
+          </p:nvPr>
+        </p:nvSpPr>
+        <p:spPr/>
+        <p:txBody>
+          <a:bodyPr/>
+          <a:lstStyle/>
+          <a:p>
+            <a:r>
+              <a:rPr lang="en-US" dirty="0"/>
+              <a:t>And finally, do we have any questions?  </a:t>
+            </a:r>
+          </a:p>
+          <a:p>
+            <a:endParaRPr lang="en-US" dirty="0"/>
+          </a:p>
+        </p:txBody>
+      </p:sp>
+      <p:sp>
+        <p:nvSpPr>
+          <p:cNvPr id="4" name="Slide Number Placeholder 3"/>
+          <p:cNvSpPr>
+            <a:spLocks noGrp="1"/>
+          </p:cNvSpPr>
+          <p:nvPr>
+            <p:ph type="sldNum" sz="quarter" idx="5"/>
+          </p:nvPr>
+        </p:nvSpPr>
+        <p:spPr/>
+        <p:txBody>
+          <a:bodyPr/>
+          <a:lstStyle/>
+          <a:p>
+            <a:fld id="{3148858F-F1DB-4027-9C85-CCA6849540DD}" type="slidenum">
+              <a:rPr lang="en-US" smtClean="0"/>
+              <a:t>28</a:t>
             </a:fld>
             <a:endParaRPr lang="en-US"/>
           </a:p>
@@ -4229,7 +4411,7 @@
           <a:p>
             <a:fld id="{C3F78080-8D0A-4BE8-A5B4-CB115102D524}" type="datetimeFigureOut">
               <a:rPr lang="en-US" smtClean="0"/>
-              <a:t>8/29/2022</a:t>
+              <a:t>8/31/2022</a:t>
             </a:fld>
             <a:endParaRPr lang="en-US"/>
           </a:p>
@@ -4427,7 +4609,7 @@
           <a:p>
             <a:fld id="{C3F78080-8D0A-4BE8-A5B4-CB115102D524}" type="datetimeFigureOut">
               <a:rPr lang="en-US" smtClean="0"/>
-              <a:t>8/29/2022</a:t>
+              <a:t>8/31/2022</a:t>
             </a:fld>
             <a:endParaRPr lang="en-US"/>
           </a:p>
@@ -4635,7 +4817,7 @@
           <a:p>
             <a:fld id="{C3F78080-8D0A-4BE8-A5B4-CB115102D524}" type="datetimeFigureOut">
               <a:rPr lang="en-US" smtClean="0"/>
-              <a:t>8/29/2022</a:t>
+              <a:t>8/31/2022</a:t>
             </a:fld>
             <a:endParaRPr lang="en-US"/>
           </a:p>
@@ -4833,7 +5015,7 @@
           <a:p>
             <a:fld id="{C3F78080-8D0A-4BE8-A5B4-CB115102D524}" type="datetimeFigureOut">
               <a:rPr lang="en-US" smtClean="0"/>
-              <a:t>8/29/2022</a:t>
+              <a:t>8/31/2022</a:t>
             </a:fld>
             <a:endParaRPr lang="en-US"/>
           </a:p>
@@ -5108,7 +5290,7 @@
           <a:p>
             <a:fld id="{C3F78080-8D0A-4BE8-A5B4-CB115102D524}" type="datetimeFigureOut">
               <a:rPr lang="en-US" smtClean="0"/>
-              <a:t>8/29/2022</a:t>
+              <a:t>8/31/2022</a:t>
             </a:fld>
             <a:endParaRPr lang="en-US"/>
           </a:p>
@@ -5373,7 +5555,7 @@
           <a:p>
             <a:fld id="{C3F78080-8D0A-4BE8-A5B4-CB115102D524}" type="datetimeFigureOut">
               <a:rPr lang="en-US" smtClean="0"/>
-              <a:t>8/29/2022</a:t>
+              <a:t>8/31/2022</a:t>
             </a:fld>
             <a:endParaRPr lang="en-US"/>
           </a:p>
@@ -5785,7 +5967,7 @@
           <a:p>
             <a:fld id="{C3F78080-8D0A-4BE8-A5B4-CB115102D524}" type="datetimeFigureOut">
               <a:rPr lang="en-US" smtClean="0"/>
-              <a:t>8/29/2022</a:t>
+              <a:t>8/31/2022</a:t>
             </a:fld>
             <a:endParaRPr lang="en-US"/>
           </a:p>
@@ -5926,7 +6108,7 @@
           <a:p>
             <a:fld id="{C3F78080-8D0A-4BE8-A5B4-CB115102D524}" type="datetimeFigureOut">
               <a:rPr lang="en-US" smtClean="0"/>
-              <a:t>8/29/2022</a:t>
+              <a:t>8/31/2022</a:t>
             </a:fld>
             <a:endParaRPr lang="en-US"/>
           </a:p>
@@ -6039,7 +6221,7 @@
           <a:p>
             <a:fld id="{C3F78080-8D0A-4BE8-A5B4-CB115102D524}" type="datetimeFigureOut">
               <a:rPr lang="en-US" smtClean="0"/>
-              <a:t>8/29/2022</a:t>
+              <a:t>8/31/2022</a:t>
             </a:fld>
             <a:endParaRPr lang="en-US"/>
           </a:p>
@@ -6350,7 +6532,7 @@
           <a:p>
             <a:fld id="{C3F78080-8D0A-4BE8-A5B4-CB115102D524}" type="datetimeFigureOut">
               <a:rPr lang="en-US" smtClean="0"/>
-              <a:t>8/29/2022</a:t>
+              <a:t>8/31/2022</a:t>
             </a:fld>
             <a:endParaRPr lang="en-US"/>
           </a:p>
@@ -6638,7 +6820,7 @@
           <a:p>
             <a:fld id="{C3F78080-8D0A-4BE8-A5B4-CB115102D524}" type="datetimeFigureOut">
               <a:rPr lang="en-US" smtClean="0"/>
-              <a:t>8/29/2022</a:t>
+              <a:t>8/31/2022</a:t>
             </a:fld>
             <a:endParaRPr lang="en-US"/>
           </a:p>
@@ -6879,7 +7061,7 @@
           <a:p>
             <a:fld id="{C3F78080-8D0A-4BE8-A5B4-CB115102D524}" type="datetimeFigureOut">
               <a:rPr lang="en-US" smtClean="0"/>
-              <a:t>8/29/2022</a:t>
+              <a:t>8/31/2022</a:t>
             </a:fld>
             <a:endParaRPr lang="en-US"/>
           </a:p>
@@ -7755,12 +7937,12 @@
   </p:clrMapOvr>
   <mc:AlternateContent xmlns:mc="http://schemas.openxmlformats.org/markup-compatibility/2006" xmlns:p14="http://schemas.microsoft.com/office/powerpoint/2010/main">
     <mc:Choice Requires="p14">
-      <p:transition spd="slow" p14:dur="3400">
-        <p14:reveal/>
+      <p:transition spd="med" p14:dur="700">
+        <p:fade/>
       </p:transition>
     </mc:Choice>
     <mc:Fallback xmlns="">
-      <p:transition spd="slow">
+      <p:transition spd="med">
         <p:fade/>
       </p:transition>
     </mc:Fallback>
@@ -8706,6 +8888,18 @@
   <p:clrMapOvr>
     <a:masterClrMapping/>
   </p:clrMapOvr>
+  <mc:AlternateContent xmlns:mc="http://schemas.openxmlformats.org/markup-compatibility/2006" xmlns:p14="http://schemas.microsoft.com/office/powerpoint/2010/main">
+    <mc:Choice Requires="p14">
+      <p:transition spd="med" p14:dur="700">
+        <p:fade/>
+      </p:transition>
+    </mc:Choice>
+    <mc:Fallback xmlns="">
+      <p:transition spd="med">
+        <p:fade/>
+      </p:transition>
+    </mc:Fallback>
+  </mc:AlternateContent>
   <p:timing>
     <p:tnLst>
       <p:par>
@@ -9944,6 +10138,142 @@
       </p:grpSpPr>
       <p:sp>
         <p:nvSpPr>
+          <p:cNvPr id="10" name="Title 1">
+            <a:extLst>
+              <a:ext uri="{FF2B5EF4-FFF2-40B4-BE49-F238E27FC236}">
+                <a16:creationId xmlns:a16="http://schemas.microsoft.com/office/drawing/2014/main" id="{5E96C13B-40E9-7FAF-35BA-2019D8CE3A7C}"/>
+              </a:ext>
+            </a:extLst>
+          </p:cNvPr>
+          <p:cNvSpPr txBox="1">
+            <a:spLocks/>
+          </p:cNvSpPr>
+          <p:nvPr/>
+        </p:nvSpPr>
+        <p:spPr>
+          <a:xfrm>
+            <a:off x="0" y="440190"/>
+            <a:ext cx="12192000" cy="834428"/>
+          </a:xfrm>
+          <a:prstGeom prst="rect">
+            <a:avLst/>
+          </a:prstGeom>
+        </p:spPr>
+        <p:txBody>
+          <a:bodyPr>
+            <a:normAutofit/>
+          </a:bodyPr>
+          <a:lstStyle>
+            <a:lvl1pPr algn="l" defTabSz="914400" rtl="0" eaLnBrk="1" latinLnBrk="0" hangingPunct="1">
+              <a:lnSpc>
+                <a:spcPct val="90000"/>
+              </a:lnSpc>
+              <a:spcBef>
+                <a:spcPct val="0"/>
+              </a:spcBef>
+              <a:buNone/>
+              <a:defRPr sz="4400" kern="1200">
+                <a:solidFill>
+                  <a:schemeClr val="tx1"/>
+                </a:solidFill>
+                <a:latin typeface="+mj-lt"/>
+                <a:ea typeface="+mj-ea"/>
+                <a:cs typeface="+mj-cs"/>
+              </a:defRPr>
+            </a:lvl1pPr>
+          </a:lstStyle>
+          <a:p>
+            <a:pPr algn="ctr"/>
+            <a:r>
+              <a:rPr lang="en-US" sz="4000" dirty="0">
+                <a:solidFill>
+                  <a:schemeClr val="tx1">
+                    <a:lumMod val="75000"/>
+                    <a:lumOff val="25000"/>
+                  </a:schemeClr>
+                </a:solidFill>
+                <a:latin typeface="Palatino Linotype" panose="02040502050505030304" pitchFamily="18" charset="0"/>
+                <a:cs typeface="Segoe UI Light" panose="020B0502040204020203" pitchFamily="34" charset="0"/>
+              </a:rPr>
+              <a:t>Getting Started</a:t>
+            </a:r>
+          </a:p>
+        </p:txBody>
+      </p:sp>
+      <p:pic>
+        <p:nvPicPr>
+          <p:cNvPr id="12" name="Picture 11">
+            <a:extLst>
+              <a:ext uri="{FF2B5EF4-FFF2-40B4-BE49-F238E27FC236}">
+                <a16:creationId xmlns:a16="http://schemas.microsoft.com/office/drawing/2014/main" id="{F9384A53-8700-AA0F-F1C5-29F34869820C}"/>
+              </a:ext>
+            </a:extLst>
+          </p:cNvPr>
+          <p:cNvPicPr>
+            <a:picLocks noChangeAspect="1"/>
+          </p:cNvPicPr>
+          <p:nvPr/>
+        </p:nvPicPr>
+        <p:blipFill>
+          <a:blip r:embed="rId3"/>
+          <a:stretch>
+            <a:fillRect/>
+          </a:stretch>
+        </p:blipFill>
+        <p:spPr>
+          <a:xfrm>
+            <a:off x="4356453" y="1653372"/>
+            <a:ext cx="3479093" cy="4193654"/>
+          </a:xfrm>
+          <a:prstGeom prst="rect">
+            <a:avLst/>
+          </a:prstGeom>
+        </p:spPr>
+      </p:pic>
+    </p:spTree>
+    <p:extLst>
+      <p:ext uri="{BB962C8B-B14F-4D97-AF65-F5344CB8AC3E}">
+        <p14:creationId xmlns:p14="http://schemas.microsoft.com/office/powerpoint/2010/main" val="3265904287"/>
+      </p:ext>
+    </p:extLst>
+  </p:cSld>
+  <p:clrMapOvr>
+    <a:masterClrMapping/>
+  </p:clrMapOvr>
+  <mc:AlternateContent xmlns:mc="http://schemas.openxmlformats.org/markup-compatibility/2006" xmlns:p14="http://schemas.microsoft.com/office/powerpoint/2010/main">
+    <mc:Choice Requires="p14">
+      <p:transition spd="med" p14:dur="700">
+        <p:fade/>
+      </p:transition>
+    </mc:Choice>
+    <mc:Fallback xmlns="">
+      <p:transition spd="med">
+        <p:fade/>
+      </p:transition>
+    </mc:Fallback>
+  </mc:AlternateContent>
+</p:sld>
+</file>
+
+<file path=ppt/slides/slide17.xml><?xml version="1.0" encoding="utf-8"?>
+<p:sld xmlns:a="http://schemas.openxmlformats.org/drawingml/2006/main" xmlns:r="http://schemas.openxmlformats.org/officeDocument/2006/relationships" xmlns:p="http://schemas.openxmlformats.org/presentationml/2006/main">
+  <p:cSld>
+    <p:spTree>
+      <p:nvGrpSpPr>
+        <p:cNvPr id="1" name=""/>
+        <p:cNvGrpSpPr/>
+        <p:nvPr/>
+      </p:nvGrpSpPr>
+      <p:grpSpPr>
+        <a:xfrm>
+          <a:off x="0" y="0"/>
+          <a:ext cx="0" cy="0"/>
+          <a:chOff x="0" y="0"/>
+          <a:chExt cx="0" cy="0"/>
+        </a:xfrm>
+      </p:grpSpPr>
+      <p:sp>
+        <p:nvSpPr>
           <p:cNvPr id="5" name="Content Placeholder 4">
             <a:extLst>
               <a:ext uri="{FF2B5EF4-FFF2-40B4-BE49-F238E27FC236}">
@@ -10031,7 +10361,7 @@
 </p:sld>
 </file>
 
-<file path=ppt/slides/slide17.xml><?xml version="1.0" encoding="utf-8"?>
+<file path=ppt/slides/slide18.xml><?xml version="1.0" encoding="utf-8"?>
 <p:sld xmlns:a="http://schemas.openxmlformats.org/drawingml/2006/main" xmlns:r="http://schemas.openxmlformats.org/officeDocument/2006/relationships" xmlns:p="http://schemas.openxmlformats.org/presentationml/2006/main">
   <p:cSld>
     <p:spTree>
@@ -10163,7 +10493,530 @@
 </p:sld>
 </file>
 
-<file path=ppt/slides/slide18.xml><?xml version="1.0" encoding="utf-8"?>
+<file path=ppt/slides/slide19.xml><?xml version="1.0" encoding="utf-8"?>
+<p:sld xmlns:a="http://schemas.openxmlformats.org/drawingml/2006/main" xmlns:r="http://schemas.openxmlformats.org/officeDocument/2006/relationships" xmlns:p="http://schemas.openxmlformats.org/presentationml/2006/main">
+  <p:cSld>
+    <p:spTree>
+      <p:nvGrpSpPr>
+        <p:cNvPr id="1" name=""/>
+        <p:cNvGrpSpPr/>
+        <p:nvPr/>
+      </p:nvGrpSpPr>
+      <p:grpSpPr>
+        <a:xfrm>
+          <a:off x="0" y="0"/>
+          <a:ext cx="0" cy="0"/>
+          <a:chOff x="0" y="0"/>
+          <a:chExt cx="0" cy="0"/>
+        </a:xfrm>
+      </p:grpSpPr>
+      <p:sp>
+        <p:nvSpPr>
+          <p:cNvPr id="3" name="Content Placeholder 2">
+            <a:extLst>
+              <a:ext uri="{FF2B5EF4-FFF2-40B4-BE49-F238E27FC236}">
+                <a16:creationId xmlns:a16="http://schemas.microsoft.com/office/drawing/2014/main" id="{56D4209D-D6DC-068B-995D-1A2B6B974E4A}"/>
+              </a:ext>
+            </a:extLst>
+          </p:cNvPr>
+          <p:cNvSpPr>
+            <a:spLocks noGrp="1"/>
+          </p:cNvSpPr>
+          <p:nvPr>
+            <p:ph idx="1"/>
+          </p:nvPr>
+        </p:nvSpPr>
+        <p:spPr>
+          <a:xfrm>
+            <a:off x="1139328" y="1735655"/>
+            <a:ext cx="4956672" cy="4463342"/>
+          </a:xfrm>
+        </p:spPr>
+        <p:txBody>
+          <a:bodyPr>
+            <a:normAutofit/>
+          </a:bodyPr>
+          <a:lstStyle/>
+          <a:p>
+            <a:pPr marL="0" indent="0">
+              <a:buNone/>
+            </a:pPr>
+            <a:r>
+              <a:rPr lang="en-US" sz="3600" dirty="0">
+                <a:solidFill>
+                  <a:srgbClr val="60BA7B"/>
+                </a:solidFill>
+              </a:rPr>
+              <a:t>Machine Learning</a:t>
+            </a:r>
+          </a:p>
+          <a:p>
+            <a:r>
+              <a:rPr lang="en-US" dirty="0"/>
+              <a:t>Regression</a:t>
+            </a:r>
+          </a:p>
+          <a:p>
+            <a:r>
+              <a:rPr lang="en-US" dirty="0"/>
+              <a:t>Principle Component Analysis</a:t>
+            </a:r>
+          </a:p>
+          <a:p>
+            <a:r>
+              <a:rPr lang="en-US" dirty="0"/>
+              <a:t>Decision Trees</a:t>
+            </a:r>
+          </a:p>
+          <a:p>
+            <a:r>
+              <a:rPr lang="en-US" dirty="0"/>
+              <a:t>Support Vector Machines</a:t>
+            </a:r>
+          </a:p>
+          <a:p>
+            <a:r>
+              <a:rPr lang="en-US" dirty="0"/>
+              <a:t>Others…</a:t>
+            </a:r>
+          </a:p>
+        </p:txBody>
+      </p:sp>
+      <p:sp>
+        <p:nvSpPr>
+          <p:cNvPr id="4" name="Title 1">
+            <a:extLst>
+              <a:ext uri="{FF2B5EF4-FFF2-40B4-BE49-F238E27FC236}">
+                <a16:creationId xmlns:a16="http://schemas.microsoft.com/office/drawing/2014/main" id="{484B8318-5A79-FFC5-A7EC-F23C2C0E7FA9}"/>
+              </a:ext>
+            </a:extLst>
+          </p:cNvPr>
+          <p:cNvSpPr txBox="1">
+            <a:spLocks/>
+          </p:cNvSpPr>
+          <p:nvPr/>
+        </p:nvSpPr>
+        <p:spPr>
+          <a:xfrm>
+            <a:off x="0" y="440190"/>
+            <a:ext cx="12192000" cy="834428"/>
+          </a:xfrm>
+          <a:prstGeom prst="rect">
+            <a:avLst/>
+          </a:prstGeom>
+        </p:spPr>
+        <p:txBody>
+          <a:bodyPr>
+            <a:normAutofit/>
+          </a:bodyPr>
+          <a:lstStyle>
+            <a:lvl1pPr algn="l" defTabSz="914400" rtl="0" eaLnBrk="1" latinLnBrk="0" hangingPunct="1">
+              <a:lnSpc>
+                <a:spcPct val="90000"/>
+              </a:lnSpc>
+              <a:spcBef>
+                <a:spcPct val="0"/>
+              </a:spcBef>
+              <a:buNone/>
+              <a:defRPr sz="4400" kern="1200">
+                <a:solidFill>
+                  <a:schemeClr val="tx1"/>
+                </a:solidFill>
+                <a:latin typeface="+mj-lt"/>
+                <a:ea typeface="+mj-ea"/>
+                <a:cs typeface="+mj-cs"/>
+              </a:defRPr>
+            </a:lvl1pPr>
+          </a:lstStyle>
+          <a:p>
+            <a:pPr algn="ctr"/>
+            <a:r>
+              <a:rPr lang="en-US" sz="4000" dirty="0">
+                <a:solidFill>
+                  <a:schemeClr val="tx1">
+                    <a:lumMod val="75000"/>
+                    <a:lumOff val="25000"/>
+                  </a:schemeClr>
+                </a:solidFill>
+                <a:latin typeface="Palatino Linotype" panose="02040502050505030304" pitchFamily="18" charset="0"/>
+                <a:cs typeface="Segoe UI Light" panose="020B0502040204020203" pitchFamily="34" charset="0"/>
+              </a:rPr>
+              <a:t>Methods</a:t>
+            </a:r>
+          </a:p>
+        </p:txBody>
+      </p:sp>
+      <p:sp>
+        <p:nvSpPr>
+          <p:cNvPr id="5" name="Content Placeholder 2">
+            <a:extLst>
+              <a:ext uri="{FF2B5EF4-FFF2-40B4-BE49-F238E27FC236}">
+                <a16:creationId xmlns:a16="http://schemas.microsoft.com/office/drawing/2014/main" id="{6E65BEA4-38D7-EB5B-2354-A07D3799F88D}"/>
+              </a:ext>
+            </a:extLst>
+          </p:cNvPr>
+          <p:cNvSpPr txBox="1">
+            <a:spLocks/>
+          </p:cNvSpPr>
+          <p:nvPr/>
+        </p:nvSpPr>
+        <p:spPr>
+          <a:xfrm>
+            <a:off x="6720288" y="1735655"/>
+            <a:ext cx="5471711" cy="4351338"/>
+          </a:xfrm>
+          <a:prstGeom prst="rect">
+            <a:avLst/>
+          </a:prstGeom>
+        </p:spPr>
+        <p:txBody>
+          <a:bodyPr vert="horz" lIns="91440" tIns="45720" rIns="91440" bIns="45720" rtlCol="0">
+            <a:normAutofit/>
+          </a:bodyPr>
+          <a:lstStyle>
+            <a:lvl1pPr marL="228600" indent="-228600" algn="l" defTabSz="914400" rtl="0" eaLnBrk="1" latinLnBrk="0" hangingPunct="1">
+              <a:lnSpc>
+                <a:spcPct val="90000"/>
+              </a:lnSpc>
+              <a:spcBef>
+                <a:spcPts val="1000"/>
+              </a:spcBef>
+              <a:buFont typeface="Arial" panose="020B0604020202020204" pitchFamily="34" charset="0"/>
+              <a:buChar char="•"/>
+              <a:defRPr sz="2800" kern="1200">
+                <a:solidFill>
+                  <a:schemeClr val="tx1"/>
+                </a:solidFill>
+                <a:latin typeface="+mn-lt"/>
+                <a:ea typeface="+mn-ea"/>
+                <a:cs typeface="+mn-cs"/>
+              </a:defRPr>
+            </a:lvl1pPr>
+            <a:lvl2pPr marL="685800" indent="-228600" algn="l" defTabSz="914400" rtl="0" eaLnBrk="1" latinLnBrk="0" hangingPunct="1">
+              <a:lnSpc>
+                <a:spcPct val="90000"/>
+              </a:lnSpc>
+              <a:spcBef>
+                <a:spcPts val="500"/>
+              </a:spcBef>
+              <a:buFont typeface="Arial" panose="020B0604020202020204" pitchFamily="34" charset="0"/>
+              <a:buChar char="•"/>
+              <a:defRPr sz="2400" kern="1200">
+                <a:solidFill>
+                  <a:schemeClr val="tx1"/>
+                </a:solidFill>
+                <a:latin typeface="+mn-lt"/>
+                <a:ea typeface="+mn-ea"/>
+                <a:cs typeface="+mn-cs"/>
+              </a:defRPr>
+            </a:lvl2pPr>
+            <a:lvl3pPr marL="1143000" indent="-228600" algn="l" defTabSz="914400" rtl="0" eaLnBrk="1" latinLnBrk="0" hangingPunct="1">
+              <a:lnSpc>
+                <a:spcPct val="90000"/>
+              </a:lnSpc>
+              <a:spcBef>
+                <a:spcPts val="500"/>
+              </a:spcBef>
+              <a:buFont typeface="Arial" panose="020B0604020202020204" pitchFamily="34" charset="0"/>
+              <a:buChar char="•"/>
+              <a:defRPr sz="2000" kern="1200">
+                <a:solidFill>
+                  <a:schemeClr val="tx1"/>
+                </a:solidFill>
+                <a:latin typeface="+mn-lt"/>
+                <a:ea typeface="+mn-ea"/>
+                <a:cs typeface="+mn-cs"/>
+              </a:defRPr>
+            </a:lvl3pPr>
+            <a:lvl4pPr marL="1600200" indent="-228600" algn="l" defTabSz="914400" rtl="0" eaLnBrk="1" latinLnBrk="0" hangingPunct="1">
+              <a:lnSpc>
+                <a:spcPct val="90000"/>
+              </a:lnSpc>
+              <a:spcBef>
+                <a:spcPts val="500"/>
+              </a:spcBef>
+              <a:buFont typeface="Arial" panose="020B0604020202020204" pitchFamily="34" charset="0"/>
+              <a:buChar char="•"/>
+              <a:defRPr sz="1800" kern="1200">
+                <a:solidFill>
+                  <a:schemeClr val="tx1"/>
+                </a:solidFill>
+                <a:latin typeface="+mn-lt"/>
+                <a:ea typeface="+mn-ea"/>
+                <a:cs typeface="+mn-cs"/>
+              </a:defRPr>
+            </a:lvl4pPr>
+            <a:lvl5pPr marL="2057400" indent="-228600" algn="l" defTabSz="914400" rtl="0" eaLnBrk="1" latinLnBrk="0" hangingPunct="1">
+              <a:lnSpc>
+                <a:spcPct val="90000"/>
+              </a:lnSpc>
+              <a:spcBef>
+                <a:spcPts val="500"/>
+              </a:spcBef>
+              <a:buFont typeface="Arial" panose="020B0604020202020204" pitchFamily="34" charset="0"/>
+              <a:buChar char="•"/>
+              <a:defRPr sz="1800" kern="1200">
+                <a:solidFill>
+                  <a:schemeClr val="tx1"/>
+                </a:solidFill>
+                <a:latin typeface="+mn-lt"/>
+                <a:ea typeface="+mn-ea"/>
+                <a:cs typeface="+mn-cs"/>
+              </a:defRPr>
+            </a:lvl5pPr>
+            <a:lvl6pPr marL="2514600" indent="-228600" algn="l" defTabSz="914400" rtl="0" eaLnBrk="1" latinLnBrk="0" hangingPunct="1">
+              <a:lnSpc>
+                <a:spcPct val="90000"/>
+              </a:lnSpc>
+              <a:spcBef>
+                <a:spcPts val="500"/>
+              </a:spcBef>
+              <a:buFont typeface="Arial" panose="020B0604020202020204" pitchFamily="34" charset="0"/>
+              <a:buChar char="•"/>
+              <a:defRPr sz="1800" kern="1200">
+                <a:solidFill>
+                  <a:schemeClr val="tx1"/>
+                </a:solidFill>
+                <a:latin typeface="+mn-lt"/>
+                <a:ea typeface="+mn-ea"/>
+                <a:cs typeface="+mn-cs"/>
+              </a:defRPr>
+            </a:lvl6pPr>
+            <a:lvl7pPr marL="2971800" indent="-228600" algn="l" defTabSz="914400" rtl="0" eaLnBrk="1" latinLnBrk="0" hangingPunct="1">
+              <a:lnSpc>
+                <a:spcPct val="90000"/>
+              </a:lnSpc>
+              <a:spcBef>
+                <a:spcPts val="500"/>
+              </a:spcBef>
+              <a:buFont typeface="Arial" panose="020B0604020202020204" pitchFamily="34" charset="0"/>
+              <a:buChar char="•"/>
+              <a:defRPr sz="1800" kern="1200">
+                <a:solidFill>
+                  <a:schemeClr val="tx1"/>
+                </a:solidFill>
+                <a:latin typeface="+mn-lt"/>
+                <a:ea typeface="+mn-ea"/>
+                <a:cs typeface="+mn-cs"/>
+              </a:defRPr>
+            </a:lvl7pPr>
+            <a:lvl8pPr marL="3429000" indent="-228600" algn="l" defTabSz="914400" rtl="0" eaLnBrk="1" latinLnBrk="0" hangingPunct="1">
+              <a:lnSpc>
+                <a:spcPct val="90000"/>
+              </a:lnSpc>
+              <a:spcBef>
+                <a:spcPts val="500"/>
+              </a:spcBef>
+              <a:buFont typeface="Arial" panose="020B0604020202020204" pitchFamily="34" charset="0"/>
+              <a:buChar char="•"/>
+              <a:defRPr sz="1800" kern="1200">
+                <a:solidFill>
+                  <a:schemeClr val="tx1"/>
+                </a:solidFill>
+                <a:latin typeface="+mn-lt"/>
+                <a:ea typeface="+mn-ea"/>
+                <a:cs typeface="+mn-cs"/>
+              </a:defRPr>
+            </a:lvl8pPr>
+            <a:lvl9pPr marL="3886200" indent="-228600" algn="l" defTabSz="914400" rtl="0" eaLnBrk="1" latinLnBrk="0" hangingPunct="1">
+              <a:lnSpc>
+                <a:spcPct val="90000"/>
+              </a:lnSpc>
+              <a:spcBef>
+                <a:spcPts val="500"/>
+              </a:spcBef>
+              <a:buFont typeface="Arial" panose="020B0604020202020204" pitchFamily="34" charset="0"/>
+              <a:buChar char="•"/>
+              <a:defRPr sz="1800" kern="1200">
+                <a:solidFill>
+                  <a:schemeClr val="tx1"/>
+                </a:solidFill>
+                <a:latin typeface="+mn-lt"/>
+                <a:ea typeface="+mn-ea"/>
+                <a:cs typeface="+mn-cs"/>
+              </a:defRPr>
+            </a:lvl9pPr>
+          </a:lstStyle>
+          <a:p>
+            <a:pPr marL="0" indent="0">
+              <a:buNone/>
+            </a:pPr>
+            <a:r>
+              <a:rPr lang="en-US" sz="3600" dirty="0">
+                <a:solidFill>
+                  <a:srgbClr val="6CB677"/>
+                </a:solidFill>
+              </a:rPr>
+              <a:t>Deep Learning</a:t>
+            </a:r>
+          </a:p>
+          <a:p>
+            <a:r>
+              <a:rPr lang="en-US" dirty="0"/>
+              <a:t>Supervised</a:t>
+            </a:r>
+          </a:p>
+          <a:p>
+            <a:r>
+              <a:rPr lang="en-US" dirty="0"/>
+              <a:t>Unsupervised</a:t>
+            </a:r>
+          </a:p>
+          <a:p>
+            <a:r>
+              <a:rPr lang="en-US" dirty="0"/>
+              <a:t>Semi-Supervised</a:t>
+            </a:r>
+          </a:p>
+          <a:p>
+            <a:r>
+              <a:rPr lang="en-US" dirty="0"/>
+              <a:t>Reinforcement</a:t>
+            </a:r>
+          </a:p>
+        </p:txBody>
+      </p:sp>
+    </p:spTree>
+    <p:extLst>
+      <p:ext uri="{BB962C8B-B14F-4D97-AF65-F5344CB8AC3E}">
+        <p14:creationId xmlns:p14="http://schemas.microsoft.com/office/powerpoint/2010/main" val="3302509771"/>
+      </p:ext>
+    </p:extLst>
+  </p:cSld>
+  <p:clrMapOvr>
+    <a:masterClrMapping/>
+  </p:clrMapOvr>
+  <mc:AlternateContent xmlns:mc="http://schemas.openxmlformats.org/markup-compatibility/2006" xmlns:p14="http://schemas.microsoft.com/office/powerpoint/2010/main">
+    <mc:Choice Requires="p14">
+      <p:transition spd="med" p14:dur="700">
+        <p:fade/>
+      </p:transition>
+    </mc:Choice>
+    <mc:Fallback xmlns="">
+      <p:transition spd="med">
+        <p:fade/>
+      </p:transition>
+    </mc:Fallback>
+  </mc:AlternateContent>
+</p:sld>
+</file>
+
+<file path=ppt/slides/slide2.xml><?xml version="1.0" encoding="utf-8"?>
+<p:sld xmlns:a="http://schemas.openxmlformats.org/drawingml/2006/main" xmlns:r="http://schemas.openxmlformats.org/officeDocument/2006/relationships" xmlns:p="http://schemas.openxmlformats.org/presentationml/2006/main">
+  <p:cSld>
+    <p:spTree>
+      <p:nvGrpSpPr>
+        <p:cNvPr id="1" name=""/>
+        <p:cNvGrpSpPr/>
+        <p:nvPr/>
+      </p:nvGrpSpPr>
+      <p:grpSpPr>
+        <a:xfrm>
+          <a:off x="0" y="0"/>
+          <a:ext cx="0" cy="0"/>
+          <a:chOff x="0" y="0"/>
+          <a:chExt cx="0" cy="0"/>
+        </a:xfrm>
+      </p:grpSpPr>
+      <p:sp>
+        <p:nvSpPr>
+          <p:cNvPr id="5" name="Content Placeholder 4">
+            <a:extLst>
+              <a:ext uri="{FF2B5EF4-FFF2-40B4-BE49-F238E27FC236}">
+                <a16:creationId xmlns:a16="http://schemas.microsoft.com/office/drawing/2014/main" id="{7C82B2FA-DB39-467C-9DC1-245874DCBCF1}"/>
+              </a:ext>
+            </a:extLst>
+          </p:cNvPr>
+          <p:cNvSpPr>
+            <a:spLocks noGrp="1"/>
+          </p:cNvSpPr>
+          <p:nvPr>
+            <p:ph idx="1"/>
+          </p:nvPr>
+        </p:nvSpPr>
+        <p:spPr>
+          <a:xfrm>
+            <a:off x="618697" y="1508760"/>
+            <a:ext cx="10576561" cy="4790124"/>
+          </a:xfrm>
+        </p:spPr>
+        <p:txBody>
+          <a:bodyPr>
+            <a:normAutofit/>
+          </a:bodyPr>
+          <a:lstStyle/>
+          <a:p>
+            <a:pPr marL="0" indent="0">
+              <a:buNone/>
+            </a:pPr>
+            <a:endParaRPr lang="en-US" dirty="0">
+              <a:latin typeface="Palatino Linotype" panose="02040502050505030304" pitchFamily="18" charset="0"/>
+            </a:endParaRPr>
+          </a:p>
+          <a:p>
+            <a:pPr marL="0" indent="0">
+              <a:buNone/>
+            </a:pPr>
+            <a:endParaRPr lang="en-US" dirty="0">
+              <a:latin typeface="Palatino Linotype" panose="02040502050505030304" pitchFamily="18" charset="0"/>
+            </a:endParaRPr>
+          </a:p>
+          <a:p>
+            <a:pPr marL="0" indent="0" algn="ctr">
+              <a:buNone/>
+            </a:pPr>
+            <a:r>
+              <a:rPr lang="en-US" sz="4400" dirty="0">
+                <a:latin typeface="Palatino Linotype" panose="02040502050505030304" pitchFamily="18" charset="0"/>
+              </a:rPr>
+              <a:t>Think about and </a:t>
+            </a:r>
+            <a:r>
+              <a:rPr lang="en-US" sz="4400" dirty="0">
+                <a:solidFill>
+                  <a:schemeClr val="accent1">
+                    <a:lumMod val="75000"/>
+                  </a:schemeClr>
+                </a:solidFill>
+                <a:latin typeface="Palatino Linotype" panose="02040502050505030304" pitchFamily="18" charset="0"/>
+              </a:rPr>
+              <a:t>creatively</a:t>
+            </a:r>
+            <a:r>
+              <a:rPr lang="en-US" sz="4400" dirty="0">
+                <a:latin typeface="Palatino Linotype" panose="02040502050505030304" pitchFamily="18" charset="0"/>
+              </a:rPr>
+              <a:t> apply AI to make the world a better place</a:t>
+            </a:r>
+          </a:p>
+        </p:txBody>
+      </p:sp>
+    </p:spTree>
+    <p:extLst>
+      <p:ext uri="{BB962C8B-B14F-4D97-AF65-F5344CB8AC3E}">
+        <p14:creationId xmlns:p14="http://schemas.microsoft.com/office/powerpoint/2010/main" val="2443628232"/>
+      </p:ext>
+    </p:extLst>
+  </p:cSld>
+  <p:clrMapOvr>
+    <a:masterClrMapping/>
+  </p:clrMapOvr>
+  <mc:AlternateContent xmlns:mc="http://schemas.openxmlformats.org/markup-compatibility/2006" xmlns:p14="http://schemas.microsoft.com/office/powerpoint/2010/main">
+    <mc:Choice Requires="p14">
+      <p:transition spd="med" p14:dur="700">
+        <p:fade/>
+      </p:transition>
+    </mc:Choice>
+    <mc:Fallback xmlns="">
+      <p:transition spd="med">
+        <p:fade/>
+      </p:transition>
+    </mc:Fallback>
+  </mc:AlternateContent>
+</p:sld>
+</file>
+
+<file path=ppt/slides/slide20.xml><?xml version="1.0" encoding="utf-8"?>
 <p:sld xmlns:a="http://schemas.openxmlformats.org/drawingml/2006/main" xmlns:r="http://schemas.openxmlformats.org/officeDocument/2006/relationships" xmlns:p="http://schemas.openxmlformats.org/presentationml/2006/main">
   <p:cSld>
     <p:spTree>
@@ -10235,7 +11088,7 @@
 </p:sld>
 </file>
 
-<file path=ppt/slides/slide19.xml><?xml version="1.0" encoding="utf-8"?>
+<file path=ppt/slides/slide21.xml><?xml version="1.0" encoding="utf-8"?>
 <p:sld xmlns:a="http://schemas.openxmlformats.org/drawingml/2006/main" xmlns:r="http://schemas.openxmlformats.org/officeDocument/2006/relationships" xmlns:p="http://schemas.openxmlformats.org/presentationml/2006/main">
   <p:cSld>
     <p:spTree>
@@ -10307,122 +11160,7 @@
 </p:sld>
 </file>
 
-<file path=ppt/slides/slide2.xml><?xml version="1.0" encoding="utf-8"?>
-<p:sld xmlns:a="http://schemas.openxmlformats.org/drawingml/2006/main" xmlns:r="http://schemas.openxmlformats.org/officeDocument/2006/relationships" xmlns:p="http://schemas.openxmlformats.org/presentationml/2006/main">
-  <p:cSld>
-    <p:spTree>
-      <p:nvGrpSpPr>
-        <p:cNvPr id="1" name=""/>
-        <p:cNvGrpSpPr/>
-        <p:nvPr/>
-      </p:nvGrpSpPr>
-      <p:grpSpPr>
-        <a:xfrm>
-          <a:off x="0" y="0"/>
-          <a:ext cx="0" cy="0"/>
-          <a:chOff x="0" y="0"/>
-          <a:chExt cx="0" cy="0"/>
-        </a:xfrm>
-      </p:grpSpPr>
-      <p:sp>
-        <p:nvSpPr>
-          <p:cNvPr id="5" name="Content Placeholder 4">
-            <a:extLst>
-              <a:ext uri="{FF2B5EF4-FFF2-40B4-BE49-F238E27FC236}">
-                <a16:creationId xmlns:a16="http://schemas.microsoft.com/office/drawing/2014/main" id="{7C82B2FA-DB39-467C-9DC1-245874DCBCF1}"/>
-              </a:ext>
-            </a:extLst>
-          </p:cNvPr>
-          <p:cNvSpPr>
-            <a:spLocks noGrp="1"/>
-          </p:cNvSpPr>
-          <p:nvPr>
-            <p:ph idx="1"/>
-          </p:nvPr>
-        </p:nvSpPr>
-        <p:spPr>
-          <a:xfrm>
-            <a:off x="618697" y="1508760"/>
-            <a:ext cx="10576561" cy="4790124"/>
-          </a:xfrm>
-        </p:spPr>
-        <p:txBody>
-          <a:bodyPr>
-            <a:normAutofit/>
-          </a:bodyPr>
-          <a:lstStyle/>
-          <a:p>
-            <a:pPr marL="0" indent="0">
-              <a:buNone/>
-            </a:pPr>
-            <a:endParaRPr lang="en-US" dirty="0">
-              <a:latin typeface="Palatino Linotype" panose="02040502050505030304" pitchFamily="18" charset="0"/>
-            </a:endParaRPr>
-          </a:p>
-          <a:p>
-            <a:pPr marL="0" indent="0">
-              <a:buNone/>
-            </a:pPr>
-            <a:endParaRPr lang="en-US" dirty="0">
-              <a:latin typeface="Palatino Linotype" panose="02040502050505030304" pitchFamily="18" charset="0"/>
-            </a:endParaRPr>
-          </a:p>
-          <a:p>
-            <a:pPr marL="0" indent="0" algn="ctr">
-              <a:buNone/>
-            </a:pPr>
-            <a:r>
-              <a:rPr lang="en-US" sz="4400" dirty="0">
-                <a:latin typeface="Palatino Linotype" panose="02040502050505030304" pitchFamily="18" charset="0"/>
-              </a:rPr>
-              <a:t>Think about and </a:t>
-            </a:r>
-            <a:r>
-              <a:rPr lang="en-US" sz="4400" dirty="0">
-                <a:solidFill>
-                  <a:schemeClr val="accent1">
-                    <a:lumMod val="75000"/>
-                  </a:schemeClr>
-                </a:solidFill>
-                <a:latin typeface="Palatino Linotype" panose="02040502050505030304" pitchFamily="18" charset="0"/>
-              </a:rPr>
-              <a:t>creatively</a:t>
-            </a:r>
-            <a:r>
-              <a:rPr lang="en-US" sz="4400" dirty="0">
-                <a:latin typeface="Palatino Linotype" panose="02040502050505030304" pitchFamily="18" charset="0"/>
-              </a:rPr>
-              <a:t> apply AI to make the world a better place</a:t>
-            </a:r>
-          </a:p>
-        </p:txBody>
-      </p:sp>
-    </p:spTree>
-    <p:extLst>
-      <p:ext uri="{BB962C8B-B14F-4D97-AF65-F5344CB8AC3E}">
-        <p14:creationId xmlns:p14="http://schemas.microsoft.com/office/powerpoint/2010/main" val="2443628232"/>
-      </p:ext>
-    </p:extLst>
-  </p:cSld>
-  <p:clrMapOvr>
-    <a:masterClrMapping/>
-  </p:clrMapOvr>
-  <mc:AlternateContent xmlns:mc="http://schemas.openxmlformats.org/markup-compatibility/2006" xmlns:p14="http://schemas.microsoft.com/office/powerpoint/2010/main">
-    <mc:Choice Requires="p14">
-      <p:transition spd="med" p14:dur="700">
-        <p:fade/>
-      </p:transition>
-    </mc:Choice>
-    <mc:Fallback xmlns="">
-      <p:transition spd="med">
-        <p:fade/>
-      </p:transition>
-    </mc:Fallback>
-  </mc:AlternateContent>
-</p:sld>
-</file>
-
-<file path=ppt/slides/slide20.xml><?xml version="1.0" encoding="utf-8"?>
+<file path=ppt/slides/slide22.xml><?xml version="1.0" encoding="utf-8"?>
 <p:sld xmlns:a="http://schemas.openxmlformats.org/drawingml/2006/main" xmlns:r="http://schemas.openxmlformats.org/officeDocument/2006/relationships" xmlns:p="http://schemas.openxmlformats.org/presentationml/2006/main">
   <p:cSld>
     <p:spTree>
@@ -10494,7 +11232,7 @@
 </p:sld>
 </file>
 
-<file path=ppt/slides/slide21.xml><?xml version="1.0" encoding="utf-8"?>
+<file path=ppt/slides/slide23.xml><?xml version="1.0" encoding="utf-8"?>
 <p:sld xmlns:a="http://schemas.openxmlformats.org/drawingml/2006/main" xmlns:r="http://schemas.openxmlformats.org/officeDocument/2006/relationships" xmlns:p="http://schemas.openxmlformats.org/presentationml/2006/main">
   <p:cSld>
     <p:spTree>
@@ -10566,7 +11304,7 @@
 </p:sld>
 </file>
 
-<file path=ppt/slides/slide22.xml><?xml version="1.0" encoding="utf-8"?>
+<file path=ppt/slides/slide24.xml><?xml version="1.0" encoding="utf-8"?>
 <p:sld xmlns:a="http://schemas.openxmlformats.org/drawingml/2006/main" xmlns:r="http://schemas.openxmlformats.org/officeDocument/2006/relationships" xmlns:p="http://schemas.openxmlformats.org/presentationml/2006/main">
   <p:cSld>
     <p:spTree>
@@ -10638,7 +11376,7 @@
 </p:sld>
 </file>
 
-<file path=ppt/slides/slide23.xml><?xml version="1.0" encoding="utf-8"?>
+<file path=ppt/slides/slide25.xml><?xml version="1.0" encoding="utf-8"?>
 <p:sld xmlns:a="http://schemas.openxmlformats.org/drawingml/2006/main" xmlns:r="http://schemas.openxmlformats.org/officeDocument/2006/relationships" xmlns:p="http://schemas.openxmlformats.org/presentationml/2006/main">
   <p:cSld>
     <p:spTree>
@@ -10710,7 +11448,7 @@
 </p:sld>
 </file>
 
-<file path=ppt/slides/slide24.xml><?xml version="1.0" encoding="utf-8"?>
+<file path=ppt/slides/slide26.xml><?xml version="1.0" encoding="utf-8"?>
 <p:sld xmlns:a="http://schemas.openxmlformats.org/drawingml/2006/main" xmlns:r="http://schemas.openxmlformats.org/officeDocument/2006/relationships" xmlns:p="http://schemas.openxmlformats.org/presentationml/2006/main">
   <p:cSld>
     <p:spTree>
@@ -10727,54 +11465,78 @@
           <a:chExt cx="0" cy="0"/>
         </a:xfrm>
       </p:grpSpPr>
-      <p:sp>
-        <p:nvSpPr>
-          <p:cNvPr id="5" name="Content Placeholder 4">
+      <p:pic>
+        <p:nvPicPr>
+          <p:cNvPr id="4" name="Picture 3">
             <a:extLst>
               <a:ext uri="{FF2B5EF4-FFF2-40B4-BE49-F238E27FC236}">
-                <a16:creationId xmlns:a16="http://schemas.microsoft.com/office/drawing/2014/main" id="{7C82B2FA-DB39-467C-9DC1-245874DCBCF1}"/>
+                <a16:creationId xmlns:a16="http://schemas.microsoft.com/office/drawing/2014/main" id="{76BC83F4-4EE1-6975-16A6-970017DE2188}"/>
               </a:ext>
             </a:extLst>
           </p:cNvPr>
-          <p:cNvSpPr>
-            <a:spLocks noGrp="1"/>
-          </p:cNvSpPr>
-          <p:nvPr>
-            <p:ph idx="1"/>
-          </p:nvPr>
-        </p:nvSpPr>
+          <p:cNvPicPr>
+            <a:picLocks noChangeAspect="1"/>
+          </p:cNvPicPr>
+          <p:nvPr/>
+        </p:nvPicPr>
+        <p:blipFill>
+          <a:blip r:embed="rId3"/>
+          <a:stretch>
+            <a:fillRect/>
+          </a:stretch>
+        </p:blipFill>
         <p:spPr>
           <a:xfrm>
-            <a:off x="0" y="894276"/>
-            <a:ext cx="12192000" cy="978525"/>
+            <a:off x="1516943" y="155843"/>
+            <a:ext cx="9158114" cy="6546314"/>
           </a:xfrm>
+          <a:prstGeom prst="rect">
+            <a:avLst/>
+          </a:prstGeom>
         </p:spPr>
-        <p:txBody>
-          <a:bodyPr>
-            <a:normAutofit lnSpcReduction="10000"/>
-          </a:bodyPr>
-          <a:lstStyle/>
-          <a:p>
-            <a:pPr marL="0" indent="0" algn="ctr">
-              <a:buNone/>
-            </a:pPr>
-            <a:endParaRPr lang="en-US" dirty="0">
-              <a:latin typeface="Palatino Linotype" panose="02040502050505030304" pitchFamily="18" charset="0"/>
-            </a:endParaRPr>
-          </a:p>
-          <a:p>
-            <a:pPr marL="0" indent="0" algn="ctr">
-              <a:buNone/>
-            </a:pPr>
-            <a:r>
-              <a:rPr lang="en-US" dirty="0">
-                <a:latin typeface="Palatino Linotype" panose="02040502050505030304" pitchFamily="18" charset="0"/>
-              </a:rPr>
-              <a:t>What does your data look like? </a:t>
-            </a:r>
-          </a:p>
-        </p:txBody>
-      </p:sp>
+      </p:pic>
+    </p:spTree>
+    <p:extLst>
+      <p:ext uri="{BB962C8B-B14F-4D97-AF65-F5344CB8AC3E}">
+        <p14:creationId xmlns:p14="http://schemas.microsoft.com/office/powerpoint/2010/main" val="2635872209"/>
+      </p:ext>
+    </p:extLst>
+  </p:cSld>
+  <p:clrMapOvr>
+    <a:masterClrMapping/>
+  </p:clrMapOvr>
+  <mc:AlternateContent xmlns:mc="http://schemas.openxmlformats.org/markup-compatibility/2006" xmlns:p14="http://schemas.microsoft.com/office/powerpoint/2010/main">
+    <mc:Choice Requires="p14">
+      <p:transition spd="med" p14:dur="700">
+        <p:fade/>
+      </p:transition>
+    </mc:Choice>
+    <mc:Fallback xmlns="">
+      <p:transition spd="med">
+        <p:fade/>
+      </p:transition>
+    </mc:Fallback>
+  </mc:AlternateContent>
+</p:sld>
+</file>
+
+<file path=ppt/slides/slide27.xml><?xml version="1.0" encoding="utf-8"?>
+<p:sld xmlns:a="http://schemas.openxmlformats.org/drawingml/2006/main" xmlns:r="http://schemas.openxmlformats.org/officeDocument/2006/relationships" xmlns:p="http://schemas.openxmlformats.org/presentationml/2006/main">
+  <p:cSld>
+    <p:spTree>
+      <p:nvGrpSpPr>
+        <p:cNvPr id="1" name=""/>
+        <p:cNvGrpSpPr/>
+        <p:nvPr/>
+      </p:nvGrpSpPr>
+      <p:grpSpPr>
+        <a:xfrm>
+          <a:off x="0" y="0"/>
+          <a:ext cx="0" cy="0"/>
+          <a:chOff x="0" y="0"/>
+          <a:chExt cx="0" cy="0"/>
+        </a:xfrm>
+      </p:grpSpPr>
       <p:pic>
         <p:nvPicPr>
           <p:cNvPr id="6" name="Picture 5">
@@ -10812,7 +11574,7 @@
         </p:blipFill>
         <p:spPr>
           <a:xfrm>
-            <a:off x="4244123" y="186914"/>
+            <a:off x="4244123" y="5590394"/>
             <a:ext cx="3703754" cy="827416"/>
           </a:xfrm>
           <a:prstGeom prst="rect">
@@ -10822,195 +11584,578 @@
       </p:pic>
       <p:sp>
         <p:nvSpPr>
-          <p:cNvPr id="9" name="TextBox 8">
+          <p:cNvPr id="12" name="Title 1">
             <a:extLst>
               <a:ext uri="{FF2B5EF4-FFF2-40B4-BE49-F238E27FC236}">
-                <a16:creationId xmlns:a16="http://schemas.microsoft.com/office/drawing/2014/main" id="{71FA8412-2A89-4D01-8696-01FE54832167}"/>
+                <a16:creationId xmlns:a16="http://schemas.microsoft.com/office/drawing/2014/main" id="{31510425-5CCF-CD7E-C725-99B262AFF309}"/>
               </a:ext>
             </a:extLst>
           </p:cNvPr>
-          <p:cNvSpPr txBox="1"/>
+          <p:cNvSpPr txBox="1">
+            <a:spLocks/>
+          </p:cNvSpPr>
           <p:nvPr/>
         </p:nvSpPr>
         <p:spPr>
           <a:xfrm>
-            <a:off x="1918474" y="2977506"/>
-            <a:ext cx="2775119" cy="400110"/>
+            <a:off x="0" y="440190"/>
+            <a:ext cx="12192000" cy="834428"/>
           </a:xfrm>
           <a:prstGeom prst="rect">
             <a:avLst/>
           </a:prstGeom>
-          <a:noFill/>
         </p:spPr>
         <p:txBody>
-          <a:bodyPr wrap="none" rtlCol="0">
-            <a:spAutoFit/>
+          <a:bodyPr>
+            <a:normAutofit/>
           </a:bodyPr>
-          <a:lstStyle/>
+          <a:lstStyle>
+            <a:lvl1pPr algn="l" defTabSz="914400" rtl="0" eaLnBrk="1" latinLnBrk="0" hangingPunct="1">
+              <a:lnSpc>
+                <a:spcPct val="90000"/>
+              </a:lnSpc>
+              <a:spcBef>
+                <a:spcPct val="0"/>
+              </a:spcBef>
+              <a:buNone/>
+              <a:defRPr sz="4400" kern="1200">
+                <a:solidFill>
+                  <a:schemeClr val="tx1"/>
+                </a:solidFill>
+                <a:latin typeface="+mj-lt"/>
+                <a:ea typeface="+mj-ea"/>
+                <a:cs typeface="+mj-cs"/>
+              </a:defRPr>
+            </a:lvl1pPr>
+          </a:lstStyle>
           <a:p>
             <a:pPr algn="ctr"/>
             <a:r>
-              <a:rPr lang="en-US" sz="2000" dirty="0">
-                <a:latin typeface="Palatino Linotype" panose="02040502050505030304" pitchFamily="18" charset="0"/>
-              </a:rPr>
-              <a:t>Structured </a:t>
-            </a:r>
-            <a:r>
-              <a:rPr lang="en-US" sz="2000" dirty="0">
+              <a:rPr lang="en-US" sz="4000" dirty="0">
                 <a:solidFill>
-                  <a:srgbClr val="517495"/>
+                  <a:schemeClr val="tx1">
+                    <a:lumMod val="75000"/>
+                    <a:lumOff val="25000"/>
+                  </a:schemeClr>
                 </a:solidFill>
                 <a:latin typeface="Palatino Linotype" panose="02040502050505030304" pitchFamily="18" charset="0"/>
+                <a:cs typeface="Segoe UI Light" panose="020B0502040204020203" pitchFamily="34" charset="0"/>
               </a:rPr>
-              <a:t>(Databases)</a:t>
-            </a:r>
-          </a:p>
-        </p:txBody>
-      </p:sp>
-      <p:sp>
-        <p:nvSpPr>
-          <p:cNvPr id="10" name="TextBox 9">
+              <a:t>What do you want to do?</a:t>
+            </a:r>
+          </a:p>
+        </p:txBody>
+      </p:sp>
+      <p:sp>
+        <p:nvSpPr>
+          <p:cNvPr id="14" name="Content Placeholder 2">
             <a:extLst>
               <a:ext uri="{FF2B5EF4-FFF2-40B4-BE49-F238E27FC236}">
-                <a16:creationId xmlns:a16="http://schemas.microsoft.com/office/drawing/2014/main" id="{2FC53033-C8E9-4648-952A-68D1FC2814DD}"/>
+                <a16:creationId xmlns:a16="http://schemas.microsoft.com/office/drawing/2014/main" id="{1F28550C-F646-7E80-D9B9-997BE2C6FA00}"/>
               </a:ext>
             </a:extLst>
           </p:cNvPr>
-          <p:cNvSpPr txBox="1"/>
-          <p:nvPr/>
+          <p:cNvSpPr>
+            <a:spLocks noGrp="1"/>
+          </p:cNvSpPr>
+          <p:nvPr>
+            <p:ph idx="1"/>
+          </p:nvPr>
         </p:nvSpPr>
         <p:spPr>
           <a:xfrm>
-            <a:off x="6813203" y="2967685"/>
-            <a:ext cx="4003468" cy="400110"/>
+            <a:off x="7105904" y="1797090"/>
+            <a:ext cx="4822760" cy="2973211"/>
+          </a:xfrm>
+        </p:spPr>
+        <p:txBody>
+          <a:bodyPr>
+            <a:normAutofit/>
+          </a:bodyPr>
+          <a:lstStyle/>
+          <a:p>
+            <a:pPr marL="0" indent="0">
+              <a:buNone/>
+            </a:pPr>
+            <a:r>
+              <a:rPr lang="en-US" sz="3600" dirty="0">
+                <a:solidFill>
+                  <a:srgbClr val="60BA7B"/>
+                </a:solidFill>
+              </a:rPr>
+              <a:t>Data</a:t>
+            </a:r>
+          </a:p>
+          <a:p>
+            <a:r>
+              <a:rPr lang="en-US" sz="2400" dirty="0"/>
+              <a:t>Structured (Databases)</a:t>
+            </a:r>
+          </a:p>
+          <a:p>
+            <a:r>
+              <a:rPr lang="en-US" sz="2400" dirty="0"/>
+              <a:t>Repetitive (Sensors, Instruments)</a:t>
+            </a:r>
+          </a:p>
+          <a:p>
+            <a:r>
+              <a:rPr lang="en-US" sz="2400" dirty="0"/>
+              <a:t>Textual (Documents, Email, Web)</a:t>
+            </a:r>
+          </a:p>
+          <a:p>
+            <a:r>
+              <a:rPr lang="en-US" sz="2400" dirty="0"/>
+              <a:t>Non-Textual (Images, Video, Audio)</a:t>
+            </a:r>
+          </a:p>
+        </p:txBody>
+      </p:sp>
+      <p:sp>
+        <p:nvSpPr>
+          <p:cNvPr id="15" name="Content Placeholder 2">
+            <a:extLst>
+              <a:ext uri="{FF2B5EF4-FFF2-40B4-BE49-F238E27FC236}">
+                <a16:creationId xmlns:a16="http://schemas.microsoft.com/office/drawing/2014/main" id="{FAE4DF93-FD24-C610-6291-9F7887F25B74}"/>
+              </a:ext>
+            </a:extLst>
+          </p:cNvPr>
+          <p:cNvSpPr txBox="1">
+            <a:spLocks/>
+          </p:cNvSpPr>
+          <p:nvPr/>
+        </p:nvSpPr>
+        <p:spPr>
+          <a:xfrm>
+            <a:off x="3807160" y="1797089"/>
+            <a:ext cx="2948848" cy="2973211"/>
           </a:xfrm>
           <a:prstGeom prst="rect">
             <a:avLst/>
           </a:prstGeom>
-          <a:noFill/>
         </p:spPr>
         <p:txBody>
-          <a:bodyPr wrap="none" rtlCol="0">
-            <a:spAutoFit/>
+          <a:bodyPr vert="horz" lIns="91440" tIns="45720" rIns="91440" bIns="45720" rtlCol="0">
+            <a:normAutofit/>
           </a:bodyPr>
-          <a:lstStyle/>
-          <a:p>
-            <a:pPr algn="ctr"/>
-            <a:r>
-              <a:rPr lang="en-US" sz="2000" dirty="0">
-                <a:latin typeface="Palatino Linotype" panose="02040502050505030304" pitchFamily="18" charset="0"/>
+          <a:lstStyle>
+            <a:lvl1pPr marL="228600" indent="-228600" algn="l" defTabSz="914400" rtl="0" eaLnBrk="1" latinLnBrk="0" hangingPunct="1">
+              <a:lnSpc>
+                <a:spcPct val="90000"/>
+              </a:lnSpc>
+              <a:spcBef>
+                <a:spcPts val="1000"/>
+              </a:spcBef>
+              <a:buFont typeface="Arial" panose="020B0604020202020204" pitchFamily="34" charset="0"/>
+              <a:buChar char="•"/>
+              <a:defRPr sz="2800" kern="1200">
+                <a:solidFill>
+                  <a:schemeClr val="tx1"/>
+                </a:solidFill>
+                <a:latin typeface="+mn-lt"/>
+                <a:ea typeface="+mn-ea"/>
+                <a:cs typeface="+mn-cs"/>
+              </a:defRPr>
+            </a:lvl1pPr>
+            <a:lvl2pPr marL="685800" indent="-228600" algn="l" defTabSz="914400" rtl="0" eaLnBrk="1" latinLnBrk="0" hangingPunct="1">
+              <a:lnSpc>
+                <a:spcPct val="90000"/>
+              </a:lnSpc>
+              <a:spcBef>
+                <a:spcPts val="500"/>
+              </a:spcBef>
+              <a:buFont typeface="Arial" panose="020B0604020202020204" pitchFamily="34" charset="0"/>
+              <a:buChar char="•"/>
+              <a:defRPr sz="2400" kern="1200">
+                <a:solidFill>
+                  <a:schemeClr val="tx1"/>
+                </a:solidFill>
+                <a:latin typeface="+mn-lt"/>
+                <a:ea typeface="+mn-ea"/>
+                <a:cs typeface="+mn-cs"/>
+              </a:defRPr>
+            </a:lvl2pPr>
+            <a:lvl3pPr marL="1143000" indent="-228600" algn="l" defTabSz="914400" rtl="0" eaLnBrk="1" latinLnBrk="0" hangingPunct="1">
+              <a:lnSpc>
+                <a:spcPct val="90000"/>
+              </a:lnSpc>
+              <a:spcBef>
+                <a:spcPts val="500"/>
+              </a:spcBef>
+              <a:buFont typeface="Arial" panose="020B0604020202020204" pitchFamily="34" charset="0"/>
+              <a:buChar char="•"/>
+              <a:defRPr sz="2000" kern="1200">
+                <a:solidFill>
+                  <a:schemeClr val="tx1"/>
+                </a:solidFill>
+                <a:latin typeface="+mn-lt"/>
+                <a:ea typeface="+mn-ea"/>
+                <a:cs typeface="+mn-cs"/>
+              </a:defRPr>
+            </a:lvl3pPr>
+            <a:lvl4pPr marL="1600200" indent="-228600" algn="l" defTabSz="914400" rtl="0" eaLnBrk="1" latinLnBrk="0" hangingPunct="1">
+              <a:lnSpc>
+                <a:spcPct val="90000"/>
+              </a:lnSpc>
+              <a:spcBef>
+                <a:spcPts val="500"/>
+              </a:spcBef>
+              <a:buFont typeface="Arial" panose="020B0604020202020204" pitchFamily="34" charset="0"/>
+              <a:buChar char="•"/>
+              <a:defRPr sz="1800" kern="1200">
+                <a:solidFill>
+                  <a:schemeClr val="tx1"/>
+                </a:solidFill>
+                <a:latin typeface="+mn-lt"/>
+                <a:ea typeface="+mn-ea"/>
+                <a:cs typeface="+mn-cs"/>
+              </a:defRPr>
+            </a:lvl4pPr>
+            <a:lvl5pPr marL="2057400" indent="-228600" algn="l" defTabSz="914400" rtl="0" eaLnBrk="1" latinLnBrk="0" hangingPunct="1">
+              <a:lnSpc>
+                <a:spcPct val="90000"/>
+              </a:lnSpc>
+              <a:spcBef>
+                <a:spcPts val="500"/>
+              </a:spcBef>
+              <a:buFont typeface="Arial" panose="020B0604020202020204" pitchFamily="34" charset="0"/>
+              <a:buChar char="•"/>
+              <a:defRPr sz="1800" kern="1200">
+                <a:solidFill>
+                  <a:schemeClr val="tx1"/>
+                </a:solidFill>
+                <a:latin typeface="+mn-lt"/>
+                <a:ea typeface="+mn-ea"/>
+                <a:cs typeface="+mn-cs"/>
+              </a:defRPr>
+            </a:lvl5pPr>
+            <a:lvl6pPr marL="2514600" indent="-228600" algn="l" defTabSz="914400" rtl="0" eaLnBrk="1" latinLnBrk="0" hangingPunct="1">
+              <a:lnSpc>
+                <a:spcPct val="90000"/>
+              </a:lnSpc>
+              <a:spcBef>
+                <a:spcPts val="500"/>
+              </a:spcBef>
+              <a:buFont typeface="Arial" panose="020B0604020202020204" pitchFamily="34" charset="0"/>
+              <a:buChar char="•"/>
+              <a:defRPr sz="1800" kern="1200">
+                <a:solidFill>
+                  <a:schemeClr val="tx1"/>
+                </a:solidFill>
+                <a:latin typeface="+mn-lt"/>
+                <a:ea typeface="+mn-ea"/>
+                <a:cs typeface="+mn-cs"/>
+              </a:defRPr>
+            </a:lvl6pPr>
+            <a:lvl7pPr marL="2971800" indent="-228600" algn="l" defTabSz="914400" rtl="0" eaLnBrk="1" latinLnBrk="0" hangingPunct="1">
+              <a:lnSpc>
+                <a:spcPct val="90000"/>
+              </a:lnSpc>
+              <a:spcBef>
+                <a:spcPts val="500"/>
+              </a:spcBef>
+              <a:buFont typeface="Arial" panose="020B0604020202020204" pitchFamily="34" charset="0"/>
+              <a:buChar char="•"/>
+              <a:defRPr sz="1800" kern="1200">
+                <a:solidFill>
+                  <a:schemeClr val="tx1"/>
+                </a:solidFill>
+                <a:latin typeface="+mn-lt"/>
+                <a:ea typeface="+mn-ea"/>
+                <a:cs typeface="+mn-cs"/>
+              </a:defRPr>
+            </a:lvl7pPr>
+            <a:lvl8pPr marL="3429000" indent="-228600" algn="l" defTabSz="914400" rtl="0" eaLnBrk="1" latinLnBrk="0" hangingPunct="1">
+              <a:lnSpc>
+                <a:spcPct val="90000"/>
+              </a:lnSpc>
+              <a:spcBef>
+                <a:spcPts val="500"/>
+              </a:spcBef>
+              <a:buFont typeface="Arial" panose="020B0604020202020204" pitchFamily="34" charset="0"/>
+              <a:buChar char="•"/>
+              <a:defRPr sz="1800" kern="1200">
+                <a:solidFill>
+                  <a:schemeClr val="tx1"/>
+                </a:solidFill>
+                <a:latin typeface="+mn-lt"/>
+                <a:ea typeface="+mn-ea"/>
+                <a:cs typeface="+mn-cs"/>
+              </a:defRPr>
+            </a:lvl8pPr>
+            <a:lvl9pPr marL="3886200" indent="-228600" algn="l" defTabSz="914400" rtl="0" eaLnBrk="1" latinLnBrk="0" hangingPunct="1">
+              <a:lnSpc>
+                <a:spcPct val="90000"/>
+              </a:lnSpc>
+              <a:spcBef>
+                <a:spcPts val="500"/>
+              </a:spcBef>
+              <a:buFont typeface="Arial" panose="020B0604020202020204" pitchFamily="34" charset="0"/>
+              <a:buChar char="•"/>
+              <a:defRPr sz="1800" kern="1200">
+                <a:solidFill>
+                  <a:schemeClr val="tx1"/>
+                </a:solidFill>
+                <a:latin typeface="+mn-lt"/>
+                <a:ea typeface="+mn-ea"/>
+                <a:cs typeface="+mn-cs"/>
+              </a:defRPr>
+            </a:lvl9pPr>
+          </a:lstStyle>
+          <a:p>
+            <a:pPr marL="0" indent="0">
+              <a:buFont typeface="Arial" panose="020B0604020202020204" pitchFamily="34" charset="0"/>
+              <a:buNone/>
+            </a:pPr>
+            <a:r>
+              <a:rPr lang="en-US" sz="3600" dirty="0">
+                <a:solidFill>
+                  <a:srgbClr val="60BA7B"/>
+                </a:solidFill>
               </a:rPr>
-              <a:t>Repetitive </a:t>
-            </a:r>
-            <a:r>
-              <a:rPr lang="en-US" sz="2000" dirty="0">
-                <a:solidFill>
-                  <a:schemeClr val="accent5">
-                    <a:lumMod val="75000"/>
-                  </a:schemeClr>
-                </a:solidFill>
-                <a:latin typeface="Palatino Linotype" panose="02040502050505030304" pitchFamily="18" charset="0"/>
-              </a:rPr>
-              <a:t>(Sensors, Instruments) </a:t>
-            </a:r>
-          </a:p>
-        </p:txBody>
-      </p:sp>
-      <p:sp>
-        <p:nvSpPr>
-          <p:cNvPr id="11" name="TextBox 10">
+              <a:t>Method</a:t>
+            </a:r>
+          </a:p>
+          <a:p>
+            <a:r>
+              <a:rPr lang="en-US" sz="2400" dirty="0"/>
+              <a:t>Machine Learning</a:t>
+            </a:r>
+          </a:p>
+          <a:p>
+            <a:r>
+              <a:rPr lang="en-US" sz="2400" dirty="0"/>
+              <a:t>Deep Learning</a:t>
+            </a:r>
+          </a:p>
+        </p:txBody>
+      </p:sp>
+      <p:sp>
+        <p:nvSpPr>
+          <p:cNvPr id="16" name="Content Placeholder 2">
             <a:extLst>
               <a:ext uri="{FF2B5EF4-FFF2-40B4-BE49-F238E27FC236}">
-                <a16:creationId xmlns:a16="http://schemas.microsoft.com/office/drawing/2014/main" id="{B5BF4CB7-83FC-4BBF-BA71-9EEE9C5AC9C6}"/>
+                <a16:creationId xmlns:a16="http://schemas.microsoft.com/office/drawing/2014/main" id="{6ED6EA24-D78A-4867-7B25-03065C4804C5}"/>
               </a:ext>
             </a:extLst>
           </p:cNvPr>
-          <p:cNvSpPr txBox="1"/>
+          <p:cNvSpPr txBox="1">
+            <a:spLocks/>
+          </p:cNvSpPr>
           <p:nvPr/>
         </p:nvSpPr>
         <p:spPr>
           <a:xfrm>
-            <a:off x="712097" y="4236087"/>
-            <a:ext cx="5187875" cy="400110"/>
+            <a:off x="739916" y="1797088"/>
+            <a:ext cx="2948848" cy="2973211"/>
           </a:xfrm>
           <a:prstGeom prst="rect">
             <a:avLst/>
           </a:prstGeom>
-          <a:noFill/>
         </p:spPr>
         <p:txBody>
-          <a:bodyPr wrap="square" rtlCol="0">
-            <a:spAutoFit/>
+          <a:bodyPr vert="horz" lIns="91440" tIns="45720" rIns="91440" bIns="45720" rtlCol="0">
+            <a:normAutofit/>
           </a:bodyPr>
-          <a:lstStyle/>
-          <a:p>
-            <a:pPr algn="ctr"/>
-            <a:r>
-              <a:rPr lang="en-US" sz="2000" dirty="0">
-                <a:latin typeface="Palatino Linotype" panose="02040502050505030304" pitchFamily="18" charset="0"/>
+          <a:lstStyle>
+            <a:lvl1pPr marL="228600" indent="-228600" algn="l" defTabSz="914400" rtl="0" eaLnBrk="1" latinLnBrk="0" hangingPunct="1">
+              <a:lnSpc>
+                <a:spcPct val="90000"/>
+              </a:lnSpc>
+              <a:spcBef>
+                <a:spcPts val="1000"/>
+              </a:spcBef>
+              <a:buFont typeface="Arial" panose="020B0604020202020204" pitchFamily="34" charset="0"/>
+              <a:buChar char="•"/>
+              <a:defRPr sz="2800" kern="1200">
+                <a:solidFill>
+                  <a:schemeClr val="tx1"/>
+                </a:solidFill>
+                <a:latin typeface="+mn-lt"/>
+                <a:ea typeface="+mn-ea"/>
+                <a:cs typeface="+mn-cs"/>
+              </a:defRPr>
+            </a:lvl1pPr>
+            <a:lvl2pPr marL="685800" indent="-228600" algn="l" defTabSz="914400" rtl="0" eaLnBrk="1" latinLnBrk="0" hangingPunct="1">
+              <a:lnSpc>
+                <a:spcPct val="90000"/>
+              </a:lnSpc>
+              <a:spcBef>
+                <a:spcPts val="500"/>
+              </a:spcBef>
+              <a:buFont typeface="Arial" panose="020B0604020202020204" pitchFamily="34" charset="0"/>
+              <a:buChar char="•"/>
+              <a:defRPr sz="2400" kern="1200">
+                <a:solidFill>
+                  <a:schemeClr val="tx1"/>
+                </a:solidFill>
+                <a:latin typeface="+mn-lt"/>
+                <a:ea typeface="+mn-ea"/>
+                <a:cs typeface="+mn-cs"/>
+              </a:defRPr>
+            </a:lvl2pPr>
+            <a:lvl3pPr marL="1143000" indent="-228600" algn="l" defTabSz="914400" rtl="0" eaLnBrk="1" latinLnBrk="0" hangingPunct="1">
+              <a:lnSpc>
+                <a:spcPct val="90000"/>
+              </a:lnSpc>
+              <a:spcBef>
+                <a:spcPts val="500"/>
+              </a:spcBef>
+              <a:buFont typeface="Arial" panose="020B0604020202020204" pitchFamily="34" charset="0"/>
+              <a:buChar char="•"/>
+              <a:defRPr sz="2000" kern="1200">
+                <a:solidFill>
+                  <a:schemeClr val="tx1"/>
+                </a:solidFill>
+                <a:latin typeface="+mn-lt"/>
+                <a:ea typeface="+mn-ea"/>
+                <a:cs typeface="+mn-cs"/>
+              </a:defRPr>
+            </a:lvl3pPr>
+            <a:lvl4pPr marL="1600200" indent="-228600" algn="l" defTabSz="914400" rtl="0" eaLnBrk="1" latinLnBrk="0" hangingPunct="1">
+              <a:lnSpc>
+                <a:spcPct val="90000"/>
+              </a:lnSpc>
+              <a:spcBef>
+                <a:spcPts val="500"/>
+              </a:spcBef>
+              <a:buFont typeface="Arial" panose="020B0604020202020204" pitchFamily="34" charset="0"/>
+              <a:buChar char="•"/>
+              <a:defRPr sz="1800" kern="1200">
+                <a:solidFill>
+                  <a:schemeClr val="tx1"/>
+                </a:solidFill>
+                <a:latin typeface="+mn-lt"/>
+                <a:ea typeface="+mn-ea"/>
+                <a:cs typeface="+mn-cs"/>
+              </a:defRPr>
+            </a:lvl4pPr>
+            <a:lvl5pPr marL="2057400" indent="-228600" algn="l" defTabSz="914400" rtl="0" eaLnBrk="1" latinLnBrk="0" hangingPunct="1">
+              <a:lnSpc>
+                <a:spcPct val="90000"/>
+              </a:lnSpc>
+              <a:spcBef>
+                <a:spcPts val="500"/>
+              </a:spcBef>
+              <a:buFont typeface="Arial" panose="020B0604020202020204" pitchFamily="34" charset="0"/>
+              <a:buChar char="•"/>
+              <a:defRPr sz="1800" kern="1200">
+                <a:solidFill>
+                  <a:schemeClr val="tx1"/>
+                </a:solidFill>
+                <a:latin typeface="+mn-lt"/>
+                <a:ea typeface="+mn-ea"/>
+                <a:cs typeface="+mn-cs"/>
+              </a:defRPr>
+            </a:lvl5pPr>
+            <a:lvl6pPr marL="2514600" indent="-228600" algn="l" defTabSz="914400" rtl="0" eaLnBrk="1" latinLnBrk="0" hangingPunct="1">
+              <a:lnSpc>
+                <a:spcPct val="90000"/>
+              </a:lnSpc>
+              <a:spcBef>
+                <a:spcPts val="500"/>
+              </a:spcBef>
+              <a:buFont typeface="Arial" panose="020B0604020202020204" pitchFamily="34" charset="0"/>
+              <a:buChar char="•"/>
+              <a:defRPr sz="1800" kern="1200">
+                <a:solidFill>
+                  <a:schemeClr val="tx1"/>
+                </a:solidFill>
+                <a:latin typeface="+mn-lt"/>
+                <a:ea typeface="+mn-ea"/>
+                <a:cs typeface="+mn-cs"/>
+              </a:defRPr>
+            </a:lvl6pPr>
+            <a:lvl7pPr marL="2971800" indent="-228600" algn="l" defTabSz="914400" rtl="0" eaLnBrk="1" latinLnBrk="0" hangingPunct="1">
+              <a:lnSpc>
+                <a:spcPct val="90000"/>
+              </a:lnSpc>
+              <a:spcBef>
+                <a:spcPts val="500"/>
+              </a:spcBef>
+              <a:buFont typeface="Arial" panose="020B0604020202020204" pitchFamily="34" charset="0"/>
+              <a:buChar char="•"/>
+              <a:defRPr sz="1800" kern="1200">
+                <a:solidFill>
+                  <a:schemeClr val="tx1"/>
+                </a:solidFill>
+                <a:latin typeface="+mn-lt"/>
+                <a:ea typeface="+mn-ea"/>
+                <a:cs typeface="+mn-cs"/>
+              </a:defRPr>
+            </a:lvl7pPr>
+            <a:lvl8pPr marL="3429000" indent="-228600" algn="l" defTabSz="914400" rtl="0" eaLnBrk="1" latinLnBrk="0" hangingPunct="1">
+              <a:lnSpc>
+                <a:spcPct val="90000"/>
+              </a:lnSpc>
+              <a:spcBef>
+                <a:spcPts val="500"/>
+              </a:spcBef>
+              <a:buFont typeface="Arial" panose="020B0604020202020204" pitchFamily="34" charset="0"/>
+              <a:buChar char="•"/>
+              <a:defRPr sz="1800" kern="1200">
+                <a:solidFill>
+                  <a:schemeClr val="tx1"/>
+                </a:solidFill>
+                <a:latin typeface="+mn-lt"/>
+                <a:ea typeface="+mn-ea"/>
+                <a:cs typeface="+mn-cs"/>
+              </a:defRPr>
+            </a:lvl8pPr>
+            <a:lvl9pPr marL="3886200" indent="-228600" algn="l" defTabSz="914400" rtl="0" eaLnBrk="1" latinLnBrk="0" hangingPunct="1">
+              <a:lnSpc>
+                <a:spcPct val="90000"/>
+              </a:lnSpc>
+              <a:spcBef>
+                <a:spcPts val="500"/>
+              </a:spcBef>
+              <a:buFont typeface="Arial" panose="020B0604020202020204" pitchFamily="34" charset="0"/>
+              <a:buChar char="•"/>
+              <a:defRPr sz="1800" kern="1200">
+                <a:solidFill>
+                  <a:schemeClr val="tx1"/>
+                </a:solidFill>
+                <a:latin typeface="+mn-lt"/>
+                <a:ea typeface="+mn-ea"/>
+                <a:cs typeface="+mn-cs"/>
+              </a:defRPr>
+            </a:lvl9pPr>
+          </a:lstStyle>
+          <a:p>
+            <a:pPr marL="0" indent="0">
+              <a:buFont typeface="Arial" panose="020B0604020202020204" pitchFamily="34" charset="0"/>
+              <a:buNone/>
+            </a:pPr>
+            <a:r>
+              <a:rPr lang="en-US" sz="3600" dirty="0">
+                <a:solidFill>
+                  <a:srgbClr val="60BA7B"/>
+                </a:solidFill>
               </a:rPr>
-              <a:t>Textual </a:t>
-            </a:r>
-            <a:r>
-              <a:rPr lang="en-US" sz="2000" dirty="0">
-                <a:solidFill>
-                  <a:schemeClr val="accent5">
-                    <a:lumMod val="75000"/>
-                  </a:schemeClr>
-                </a:solidFill>
-                <a:latin typeface="Palatino Linotype" panose="02040502050505030304" pitchFamily="18" charset="0"/>
-              </a:rPr>
-              <a:t>(Documents, Email, Web Content)</a:t>
-            </a:r>
-          </a:p>
-        </p:txBody>
-      </p:sp>
-      <p:sp>
-        <p:nvSpPr>
-          <p:cNvPr id="13" name="TextBox 12">
-            <a:extLst>
-              <a:ext uri="{FF2B5EF4-FFF2-40B4-BE49-F238E27FC236}">
-                <a16:creationId xmlns:a16="http://schemas.microsoft.com/office/drawing/2014/main" id="{D2D802A4-1BE1-4CEA-9A99-BDC1530D2E89}"/>
-              </a:ext>
-            </a:extLst>
-          </p:cNvPr>
-          <p:cNvSpPr txBox="1"/>
-          <p:nvPr/>
-        </p:nvSpPr>
-        <p:spPr>
-          <a:xfrm>
-            <a:off x="6512351" y="4231926"/>
-            <a:ext cx="4304320" cy="400110"/>
-          </a:xfrm>
-          <a:prstGeom prst="rect">
-            <a:avLst/>
-          </a:prstGeom>
-          <a:noFill/>
-        </p:spPr>
-        <p:txBody>
-          <a:bodyPr wrap="none" rtlCol="0">
-            <a:spAutoFit/>
-          </a:bodyPr>
-          <a:lstStyle/>
-          <a:p>
-            <a:pPr algn="ctr"/>
-            <a:r>
-              <a:rPr lang="en-US" sz="2000" dirty="0">
-                <a:latin typeface="Palatino Linotype" panose="02040502050505030304" pitchFamily="18" charset="0"/>
-              </a:rPr>
-              <a:t>Non-Textual </a:t>
-            </a:r>
-            <a:r>
-              <a:rPr lang="en-US" sz="2000" dirty="0">
-                <a:solidFill>
-                  <a:schemeClr val="accent5">
-                    <a:lumMod val="75000"/>
-                  </a:schemeClr>
-                </a:solidFill>
-                <a:latin typeface="Palatino Linotype" panose="02040502050505030304" pitchFamily="18" charset="0"/>
-              </a:rPr>
-              <a:t>(Images, Video, Audio)</a:t>
-            </a:r>
+              <a:t>Question</a:t>
+            </a:r>
+          </a:p>
+          <a:p>
+            <a:r>
+              <a:rPr lang="en-US" sz="2400" dirty="0"/>
+              <a:t>What?</a:t>
+            </a:r>
+          </a:p>
+          <a:p>
+            <a:r>
+              <a:rPr lang="en-US" sz="2400" dirty="0"/>
+              <a:t>Why?</a:t>
+            </a:r>
+          </a:p>
+          <a:p>
+            <a:r>
+              <a:rPr lang="en-US" sz="2400" dirty="0"/>
+              <a:t>How?</a:t>
+            </a:r>
+          </a:p>
+          <a:p>
+            <a:endParaRPr lang="en-US" sz="2400" dirty="0"/>
           </a:p>
         </p:txBody>
       </p:sp>
@@ -11039,79 +12184,7 @@
 </p:sld>
 </file>
 
-<file path=ppt/slides/slide25.xml><?xml version="1.0" encoding="utf-8"?>
-<p:sld xmlns:a="http://schemas.openxmlformats.org/drawingml/2006/main" xmlns:r="http://schemas.openxmlformats.org/officeDocument/2006/relationships" xmlns:p="http://schemas.openxmlformats.org/presentationml/2006/main">
-  <p:cSld>
-    <p:spTree>
-      <p:nvGrpSpPr>
-        <p:cNvPr id="1" name=""/>
-        <p:cNvGrpSpPr/>
-        <p:nvPr/>
-      </p:nvGrpSpPr>
-      <p:grpSpPr>
-        <a:xfrm>
-          <a:off x="0" y="0"/>
-          <a:ext cx="0" cy="0"/>
-          <a:chOff x="0" y="0"/>
-          <a:chExt cx="0" cy="0"/>
-        </a:xfrm>
-      </p:grpSpPr>
-      <p:pic>
-        <p:nvPicPr>
-          <p:cNvPr id="17" name="Picture 16">
-            <a:extLst>
-              <a:ext uri="{FF2B5EF4-FFF2-40B4-BE49-F238E27FC236}">
-                <a16:creationId xmlns:a16="http://schemas.microsoft.com/office/drawing/2014/main" id="{0F52C6C2-BFB8-474F-9665-8B9559A02619}"/>
-              </a:ext>
-            </a:extLst>
-          </p:cNvPr>
-          <p:cNvPicPr>
-            <a:picLocks noChangeAspect="1"/>
-          </p:cNvPicPr>
-          <p:nvPr/>
-        </p:nvPicPr>
-        <p:blipFill>
-          <a:blip r:embed="rId3"/>
-          <a:stretch>
-            <a:fillRect/>
-          </a:stretch>
-        </p:blipFill>
-        <p:spPr>
-          <a:xfrm>
-            <a:off x="2176462" y="600075"/>
-            <a:ext cx="7839075" cy="5657850"/>
-          </a:xfrm>
-          <a:prstGeom prst="rect">
-            <a:avLst/>
-          </a:prstGeom>
-        </p:spPr>
-      </p:pic>
-    </p:spTree>
-    <p:extLst>
-      <p:ext uri="{BB962C8B-B14F-4D97-AF65-F5344CB8AC3E}">
-        <p14:creationId xmlns:p14="http://schemas.microsoft.com/office/powerpoint/2010/main" val="2635872209"/>
-      </p:ext>
-    </p:extLst>
-  </p:cSld>
-  <p:clrMapOvr>
-    <a:masterClrMapping/>
-  </p:clrMapOvr>
-  <mc:AlternateContent xmlns:mc="http://schemas.openxmlformats.org/markup-compatibility/2006" xmlns:p14="http://schemas.microsoft.com/office/powerpoint/2010/main">
-    <mc:Choice Requires="p14">
-      <p:transition spd="slow" p14:dur="3400">
-        <p14:reveal/>
-      </p:transition>
-    </mc:Choice>
-    <mc:Fallback xmlns="">
-      <p:transition spd="slow">
-        <p:fade/>
-      </p:transition>
-    </mc:Fallback>
-  </mc:AlternateContent>
-</p:sld>
-</file>
-
-<file path=ppt/slides/slide26.xml><?xml version="1.0" encoding="utf-8"?>
+<file path=ppt/slides/slide28.xml><?xml version="1.0" encoding="utf-8"?>
 <p:sld xmlns:a="http://schemas.openxmlformats.org/drawingml/2006/main" xmlns:r="http://schemas.openxmlformats.org/officeDocument/2006/relationships" xmlns:p="http://schemas.openxmlformats.org/presentationml/2006/main">
   <p:cSld>
     <p:spTree>
@@ -11224,12 +12297,12 @@
   </p:clrMapOvr>
   <mc:AlternateContent xmlns:mc="http://schemas.openxmlformats.org/markup-compatibility/2006" xmlns:p14="http://schemas.microsoft.com/office/powerpoint/2010/main">
     <mc:Choice Requires="p14">
-      <p:transition spd="slow" p14:dur="3400">
-        <p14:reveal/>
+      <p:transition spd="med" p14:dur="700">
+        <p:fade/>
       </p:transition>
     </mc:Choice>
     <mc:Fallback xmlns="">
-      <p:transition spd="slow">
+      <p:transition spd="med">
         <p:fade/>
       </p:transition>
     </mc:Fallback>
@@ -11800,6 +12873,18 @@
   <p:clrMapOvr>
     <a:masterClrMapping/>
   </p:clrMapOvr>
+  <mc:AlternateContent xmlns:mc="http://schemas.openxmlformats.org/markup-compatibility/2006" xmlns:p14="http://schemas.microsoft.com/office/powerpoint/2010/main">
+    <mc:Choice Requires="p14">
+      <p:transition spd="med" p14:dur="700">
+        <p:fade/>
+      </p:transition>
+    </mc:Choice>
+    <mc:Fallback xmlns="">
+      <p:transition spd="med">
+        <p:fade/>
+      </p:transition>
+    </mc:Fallback>
+  </mc:AlternateContent>
 </p:sld>
 </file>
 
@@ -12835,62 +13920,6 @@
           <a:chExt cx="0" cy="0"/>
         </a:xfrm>
       </p:grpSpPr>
-      <p:sp>
-        <p:nvSpPr>
-          <p:cNvPr id="5" name="Content Placeholder 4">
-            <a:extLst>
-              <a:ext uri="{FF2B5EF4-FFF2-40B4-BE49-F238E27FC236}">
-                <a16:creationId xmlns:a16="http://schemas.microsoft.com/office/drawing/2014/main" id="{7C82B2FA-DB39-467C-9DC1-245874DCBCF1}"/>
-              </a:ext>
-            </a:extLst>
-          </p:cNvPr>
-          <p:cNvSpPr>
-            <a:spLocks noGrp="1"/>
-          </p:cNvSpPr>
-          <p:nvPr>
-            <p:ph idx="1"/>
-          </p:nvPr>
-        </p:nvSpPr>
-        <p:spPr>
-          <a:xfrm>
-            <a:off x="728420" y="1545870"/>
-            <a:ext cx="10585343" cy="1310754"/>
-          </a:xfrm>
-        </p:spPr>
-        <p:txBody>
-          <a:bodyPr>
-            <a:normAutofit/>
-          </a:bodyPr>
-          <a:lstStyle/>
-          <a:p>
-            <a:pPr marL="0" indent="0" algn="ctr">
-              <a:buNone/>
-            </a:pPr>
-            <a:endParaRPr lang="en-US" dirty="0">
-              <a:latin typeface="Palatino Linotype" panose="02040502050505030304" pitchFamily="18" charset="0"/>
-            </a:endParaRPr>
-          </a:p>
-          <a:p>
-            <a:pPr marL="0" indent="0" algn="ctr">
-              <a:buNone/>
-            </a:pPr>
-            <a:r>
-              <a:rPr lang="en-US" dirty="0">
-                <a:latin typeface="Palatino Linotype" panose="02040502050505030304" pitchFamily="18" charset="0"/>
-              </a:rPr>
-              <a:t>How do you plan to use AI?</a:t>
-            </a:r>
-          </a:p>
-          <a:p>
-            <a:pPr marL="0" indent="0" algn="ctr">
-              <a:buNone/>
-            </a:pPr>
-            <a:endParaRPr lang="en-US" dirty="0">
-              <a:latin typeface="Palatino Linotype" panose="02040502050505030304" pitchFamily="18" charset="0"/>
-            </a:endParaRPr>
-          </a:p>
-        </p:txBody>
-      </p:sp>
       <p:pic>
         <p:nvPicPr>
           <p:cNvPr id="3" name="Picture 2">
@@ -12931,7 +13960,7 @@
         </p:blipFill>
         <p:spPr>
           <a:xfrm>
-            <a:off x="4055100" y="523235"/>
+            <a:off x="4244123" y="5590394"/>
             <a:ext cx="3703754" cy="827416"/>
           </a:xfrm>
           <a:prstGeom prst="rect">
@@ -12953,7 +13982,7 @@
         </p:nvSpPr>
         <p:spPr>
           <a:xfrm>
-            <a:off x="4582155" y="4167234"/>
+            <a:off x="4582155" y="3065547"/>
             <a:ext cx="2693289" cy="461665"/>
           </a:xfrm>
           <a:prstGeom prst="rect">
@@ -13011,7 +14040,7 @@
         </p:nvSpPr>
         <p:spPr>
           <a:xfrm>
-            <a:off x="4582155" y="3403139"/>
+            <a:off x="4582155" y="2301452"/>
             <a:ext cx="2693289" cy="461665"/>
           </a:xfrm>
           <a:prstGeom prst="rect">
@@ -13069,7 +14098,7 @@
         </p:nvSpPr>
         <p:spPr>
           <a:xfrm>
-            <a:off x="4582155" y="4941268"/>
+            <a:off x="4582155" y="3839581"/>
             <a:ext cx="2693289" cy="461665"/>
           </a:xfrm>
           <a:prstGeom prst="rect">
@@ -13109,6 +14138,70 @@
                 <a:latin typeface="Palatino Linotype" panose="02040502050505030304" pitchFamily="18" charset="0"/>
               </a:rPr>
               <a:t>Consult / Teach</a:t>
+            </a:r>
+          </a:p>
+        </p:txBody>
+      </p:sp>
+      <p:sp>
+        <p:nvSpPr>
+          <p:cNvPr id="7" name="Title 1">
+            <a:extLst>
+              <a:ext uri="{FF2B5EF4-FFF2-40B4-BE49-F238E27FC236}">
+                <a16:creationId xmlns:a16="http://schemas.microsoft.com/office/drawing/2014/main" id="{24B94AA1-EB04-6998-0714-191CCFCCE774}"/>
+              </a:ext>
+            </a:extLst>
+          </p:cNvPr>
+          <p:cNvSpPr txBox="1">
+            <a:spLocks/>
+          </p:cNvSpPr>
+          <p:nvPr/>
+        </p:nvSpPr>
+        <p:spPr>
+          <a:xfrm>
+            <a:off x="0" y="440190"/>
+            <a:ext cx="12192000" cy="834428"/>
+          </a:xfrm>
+          <a:prstGeom prst="rect">
+            <a:avLst/>
+          </a:prstGeom>
+        </p:spPr>
+        <p:txBody>
+          <a:bodyPr>
+            <a:normAutofit/>
+          </a:bodyPr>
+          <a:lstStyle>
+            <a:lvl1pPr algn="l" defTabSz="914400" rtl="0" eaLnBrk="1" latinLnBrk="0" hangingPunct="1">
+              <a:lnSpc>
+                <a:spcPct val="90000"/>
+              </a:lnSpc>
+              <a:spcBef>
+                <a:spcPct val="0"/>
+              </a:spcBef>
+              <a:buNone/>
+              <a:defRPr sz="4400" kern="1200">
+                <a:solidFill>
+                  <a:schemeClr val="tx1"/>
+                </a:solidFill>
+                <a:latin typeface="+mj-lt"/>
+                <a:ea typeface="+mj-ea"/>
+                <a:cs typeface="+mj-cs"/>
+              </a:defRPr>
+            </a:lvl1pPr>
+          </a:lstStyle>
+          <a:p>
+            <a:pPr algn="ctr"/>
+            <a:r>
+              <a:rPr lang="en-US" sz="4000" dirty="0">
+                <a:solidFill>
+                  <a:schemeClr val="tx1">
+                    <a:lumMod val="75000"/>
+                    <a:lumOff val="25000"/>
+                  </a:schemeClr>
+                </a:solidFill>
+                <a:latin typeface="Palatino Linotype" panose="02040502050505030304" pitchFamily="18" charset="0"/>
+                <a:cs typeface="Segoe UI Light" panose="020B0502040204020203" pitchFamily="34" charset="0"/>
+              </a:rPr>
+              <a:t>How do you plan to use AI?</a:t>
             </a:r>
           </a:p>
         </p:txBody>

</xml_diff>